<commit_message>
The Readme and ORACLE scripts
</commit_message>
<xml_diff>
--- a/doc/altron-ms-demo-20190802.pptx
+++ b/doc/altron-ms-demo-20190802.pptx
@@ -13,14 +13,15 @@
     <p:sldId id="261" r:id="rId7"/>
     <p:sldId id="263" r:id="rId8"/>
     <p:sldId id="262" r:id="rId9"/>
-    <p:sldId id="270" r:id="rId10"/>
-    <p:sldId id="264" r:id="rId11"/>
-    <p:sldId id="265" r:id="rId12"/>
-    <p:sldId id="266" r:id="rId13"/>
-    <p:sldId id="267" r:id="rId14"/>
-    <p:sldId id="268" r:id="rId15"/>
-    <p:sldId id="269" r:id="rId16"/>
-    <p:sldId id="271" r:id="rId17"/>
+    <p:sldId id="272" r:id="rId10"/>
+    <p:sldId id="270" r:id="rId11"/>
+    <p:sldId id="264" r:id="rId12"/>
+    <p:sldId id="265" r:id="rId13"/>
+    <p:sldId id="266" r:id="rId14"/>
+    <p:sldId id="267" r:id="rId15"/>
+    <p:sldId id="268" r:id="rId16"/>
+    <p:sldId id="269" r:id="rId17"/>
+    <p:sldId id="271" r:id="rId18"/>
   </p:sldIdLst>
   <p:sldSz cx="12192000" cy="6858000"/>
   <p:notesSz cx="6858000" cy="9144000"/>
@@ -258,7 +259,7 @@
           <a:p>
             <a:fld id="{C4A4753A-7876-4E89-AE1D-DA10F6189BA3}" type="datetimeFigureOut">
               <a:rPr lang="en-ZA" smtClean="0"/>
-              <a:t>01/08/2019</a:t>
+              <a:t>02/08/2019</a:t>
             </a:fld>
             <a:endParaRPr lang="en-ZA"/>
           </a:p>
@@ -428,7 +429,7 @@
           <a:p>
             <a:fld id="{C4A4753A-7876-4E89-AE1D-DA10F6189BA3}" type="datetimeFigureOut">
               <a:rPr lang="en-ZA" smtClean="0"/>
-              <a:t>01/08/2019</a:t>
+              <a:t>02/08/2019</a:t>
             </a:fld>
             <a:endParaRPr lang="en-ZA"/>
           </a:p>
@@ -608,7 +609,7 @@
           <a:p>
             <a:fld id="{C4A4753A-7876-4E89-AE1D-DA10F6189BA3}" type="datetimeFigureOut">
               <a:rPr lang="en-ZA" smtClean="0"/>
-              <a:t>01/08/2019</a:t>
+              <a:t>02/08/2019</a:t>
             </a:fld>
             <a:endParaRPr lang="en-ZA"/>
           </a:p>
@@ -778,7 +779,7 @@
           <a:p>
             <a:fld id="{C4A4753A-7876-4E89-AE1D-DA10F6189BA3}" type="datetimeFigureOut">
               <a:rPr lang="en-ZA" smtClean="0"/>
-              <a:t>01/08/2019</a:t>
+              <a:t>02/08/2019</a:t>
             </a:fld>
             <a:endParaRPr lang="en-ZA"/>
           </a:p>
@@ -1024,7 +1025,7 @@
           <a:p>
             <a:fld id="{C4A4753A-7876-4E89-AE1D-DA10F6189BA3}" type="datetimeFigureOut">
               <a:rPr lang="en-ZA" smtClean="0"/>
-              <a:t>01/08/2019</a:t>
+              <a:t>02/08/2019</a:t>
             </a:fld>
             <a:endParaRPr lang="en-ZA"/>
           </a:p>
@@ -1256,7 +1257,7 @@
           <a:p>
             <a:fld id="{C4A4753A-7876-4E89-AE1D-DA10F6189BA3}" type="datetimeFigureOut">
               <a:rPr lang="en-ZA" smtClean="0"/>
-              <a:t>01/08/2019</a:t>
+              <a:t>02/08/2019</a:t>
             </a:fld>
             <a:endParaRPr lang="en-ZA"/>
           </a:p>
@@ -1623,7 +1624,7 @@
           <a:p>
             <a:fld id="{C4A4753A-7876-4E89-AE1D-DA10F6189BA3}" type="datetimeFigureOut">
               <a:rPr lang="en-ZA" smtClean="0"/>
-              <a:t>01/08/2019</a:t>
+              <a:t>02/08/2019</a:t>
             </a:fld>
             <a:endParaRPr lang="en-ZA"/>
           </a:p>
@@ -1741,7 +1742,7 @@
           <a:p>
             <a:fld id="{C4A4753A-7876-4E89-AE1D-DA10F6189BA3}" type="datetimeFigureOut">
               <a:rPr lang="en-ZA" smtClean="0"/>
-              <a:t>01/08/2019</a:t>
+              <a:t>02/08/2019</a:t>
             </a:fld>
             <a:endParaRPr lang="en-ZA"/>
           </a:p>
@@ -1836,7 +1837,7 @@
           <a:p>
             <a:fld id="{C4A4753A-7876-4E89-AE1D-DA10F6189BA3}" type="datetimeFigureOut">
               <a:rPr lang="en-ZA" smtClean="0"/>
-              <a:t>01/08/2019</a:t>
+              <a:t>02/08/2019</a:t>
             </a:fld>
             <a:endParaRPr lang="en-ZA"/>
           </a:p>
@@ -2113,7 +2114,7 @@
           <a:p>
             <a:fld id="{C4A4753A-7876-4E89-AE1D-DA10F6189BA3}" type="datetimeFigureOut">
               <a:rPr lang="en-ZA" smtClean="0"/>
-              <a:t>01/08/2019</a:t>
+              <a:t>02/08/2019</a:t>
             </a:fld>
             <a:endParaRPr lang="en-ZA"/>
           </a:p>
@@ -2366,7 +2367,7 @@
           <a:p>
             <a:fld id="{C4A4753A-7876-4E89-AE1D-DA10F6189BA3}" type="datetimeFigureOut">
               <a:rPr lang="en-ZA" smtClean="0"/>
-              <a:t>01/08/2019</a:t>
+              <a:t>02/08/2019</a:t>
             </a:fld>
             <a:endParaRPr lang="en-ZA"/>
           </a:p>
@@ -2579,7 +2580,7 @@
           <a:p>
             <a:fld id="{C4A4753A-7876-4E89-AE1D-DA10F6189BA3}" type="datetimeFigureOut">
               <a:rPr lang="en-ZA" smtClean="0"/>
-              <a:t>01/08/2019</a:t>
+              <a:t>02/08/2019</a:t>
             </a:fld>
             <a:endParaRPr lang="en-ZA"/>
           </a:p>
@@ -3073,6 +3074,46 @@
       </p:grpSpPr>
       <p:sp>
         <p:nvSpPr>
+          <p:cNvPr id="25" name="Oval 24"/>
+          <p:cNvSpPr/>
+          <p:nvPr/>
+        </p:nvSpPr>
+        <p:spPr>
+          <a:xfrm>
+            <a:off x="7624612" y="4518926"/>
+            <a:ext cx="219635" cy="320992"/>
+          </a:xfrm>
+          <a:prstGeom prst="ellipse">
+            <a:avLst/>
+          </a:prstGeom>
+        </p:spPr>
+        <p:style>
+          <a:lnRef idx="2">
+            <a:schemeClr val="accent1">
+              <a:shade val="50000"/>
+            </a:schemeClr>
+          </a:lnRef>
+          <a:fillRef idx="1">
+            <a:schemeClr val="accent1"/>
+          </a:fillRef>
+          <a:effectRef idx="0">
+            <a:schemeClr val="accent1"/>
+          </a:effectRef>
+          <a:fontRef idx="minor">
+            <a:schemeClr val="lt1"/>
+          </a:fontRef>
+        </p:style>
+        <p:txBody>
+          <a:bodyPr rtlCol="0" anchor="ctr"/>
+          <a:lstStyle/>
+          <a:p>
+            <a:pPr algn="ctr"/>
+            <a:endParaRPr lang="en-ZA"/>
+          </a:p>
+        </p:txBody>
+      </p:sp>
+      <p:sp>
+        <p:nvSpPr>
           <p:cNvPr id="2" name="Title 1"/>
           <p:cNvSpPr>
             <a:spLocks noGrp="1"/>
@@ -3088,78 +3129,576 @@
           <a:p>
             <a:r>
               <a:rPr lang="en-US" dirty="0" smtClean="0"/>
-              <a:t>Not included into the concept</a:t>
+              <a:t>The Integration Patterns</a:t>
             </a:r>
             <a:endParaRPr lang="en-ZA" dirty="0"/>
           </a:p>
         </p:txBody>
       </p:sp>
-      <p:sp>
-        <p:nvSpPr>
-          <p:cNvPr id="4" name="TextBox 3"/>
-          <p:cNvSpPr txBox="1"/>
-          <p:nvPr/>
-        </p:nvSpPr>
-        <p:spPr>
-          <a:xfrm>
-            <a:off x="522514" y="1593669"/>
-            <a:ext cx="10831286" cy="369332"/>
-          </a:xfrm>
-          <a:prstGeom prst="rect">
-            <a:avLst/>
-          </a:prstGeom>
-          <a:noFill/>
-        </p:spPr>
-        <p:txBody>
-          <a:bodyPr wrap="square" rtlCol="0">
-            <a:spAutoFit/>
-          </a:bodyPr>
-          <a:lstStyle/>
-          <a:p>
-            <a:r>
-              <a:rPr lang="en-US" dirty="0" smtClean="0"/>
-              <a:t>* Configuration: the Spring Could </a:t>
-            </a:r>
-            <a:r>
-              <a:rPr lang="en-US" dirty="0" err="1" smtClean="0"/>
-              <a:t>Config</a:t>
-            </a:r>
-            <a:r>
-              <a:rPr lang="en-US" dirty="0" smtClean="0"/>
-              <a:t> Server with the </a:t>
-            </a:r>
-            <a:r>
-              <a:rPr lang="en-US" dirty="0" err="1" smtClean="0"/>
-              <a:t>Git</a:t>
-            </a:r>
-            <a:r>
-              <a:rPr lang="en-US" dirty="0" smtClean="0"/>
-              <a:t>- based storage of the </a:t>
-            </a:r>
-            <a:r>
-              <a:rPr lang="en-US" dirty="0" err="1" smtClean="0"/>
-              <a:t>config</a:t>
-            </a:r>
-            <a:r>
-              <a:rPr lang="en-US" dirty="0" smtClean="0"/>
-              <a:t> files for all environments;</a:t>
-            </a:r>
-            <a:endParaRPr lang="en-ZA" dirty="0"/>
-          </a:p>
-        </p:txBody>
-      </p:sp>
-      <p:sp>
-        <p:nvSpPr>
-          <p:cNvPr id="5" name="Rectangle 4"/>
+      <p:grpSp>
+        <p:nvGrpSpPr>
+          <p:cNvPr id="9" name="Group 8"/>
+          <p:cNvGrpSpPr/>
+          <p:nvPr/>
+        </p:nvGrpSpPr>
+        <p:grpSpPr>
+          <a:xfrm>
+            <a:off x="991241" y="1986523"/>
+            <a:ext cx="9337125" cy="1377519"/>
+            <a:chOff x="1349829" y="1690688"/>
+            <a:chExt cx="9337125" cy="1377519"/>
+          </a:xfrm>
+        </p:grpSpPr>
+        <p:sp>
+          <p:nvSpPr>
+            <p:cNvPr id="4" name="Flowchart: Process 3"/>
+            <p:cNvSpPr/>
+            <p:nvPr/>
+          </p:nvSpPr>
+          <p:spPr>
+            <a:xfrm>
+              <a:off x="1349829" y="1690688"/>
+              <a:ext cx="9337125" cy="320992"/>
+            </a:xfrm>
+            <a:prstGeom prst="flowChartProcess">
+              <a:avLst/>
+            </a:prstGeom>
+          </p:spPr>
+          <p:style>
+            <a:lnRef idx="2">
+              <a:schemeClr val="accent1">
+                <a:shade val="50000"/>
+              </a:schemeClr>
+            </a:lnRef>
+            <a:fillRef idx="1">
+              <a:schemeClr val="accent1"/>
+            </a:fillRef>
+            <a:effectRef idx="0">
+              <a:schemeClr val="accent1"/>
+            </a:effectRef>
+            <a:fontRef idx="minor">
+              <a:schemeClr val="lt1"/>
+            </a:fontRef>
+          </p:style>
+          <p:txBody>
+            <a:bodyPr rtlCol="0" anchor="ctr"/>
+            <a:lstStyle/>
+            <a:p>
+              <a:pPr algn="ctr"/>
+              <a:r>
+                <a:rPr lang="en-US" dirty="0" smtClean="0"/>
+                <a:t>Discovery Service (Eureka)</a:t>
+              </a:r>
+              <a:endParaRPr lang="en-ZA" dirty="0"/>
+            </a:p>
+          </p:txBody>
+        </p:sp>
+        <p:sp>
+          <p:nvSpPr>
+            <p:cNvPr id="5" name="Flowchart: Process 4"/>
+            <p:cNvSpPr/>
+            <p:nvPr/>
+          </p:nvSpPr>
+          <p:spPr>
+            <a:xfrm>
+              <a:off x="1349829" y="2317705"/>
+              <a:ext cx="1445623" cy="698546"/>
+            </a:xfrm>
+            <a:prstGeom prst="flowChartProcess">
+              <a:avLst/>
+            </a:prstGeom>
+          </p:spPr>
+          <p:style>
+            <a:lnRef idx="2">
+              <a:schemeClr val="accent1">
+                <a:shade val="50000"/>
+              </a:schemeClr>
+            </a:lnRef>
+            <a:fillRef idx="1">
+              <a:schemeClr val="accent1"/>
+            </a:fillRef>
+            <a:effectRef idx="0">
+              <a:schemeClr val="accent1"/>
+            </a:effectRef>
+            <a:fontRef idx="minor">
+              <a:schemeClr val="lt1"/>
+            </a:fontRef>
+          </p:style>
+          <p:txBody>
+            <a:bodyPr rtlCol="0" anchor="ctr"/>
+            <a:lstStyle/>
+            <a:p>
+              <a:pPr algn="ctr"/>
+              <a:r>
+                <a:rPr lang="en-US" dirty="0" smtClean="0"/>
+                <a:t>Service A</a:t>
+              </a:r>
+              <a:endParaRPr lang="en-ZA" dirty="0"/>
+            </a:p>
+          </p:txBody>
+        </p:sp>
+        <p:sp>
+          <p:nvSpPr>
+            <p:cNvPr id="6" name="Flowchart: Process 5"/>
+            <p:cNvSpPr/>
+            <p:nvPr/>
+          </p:nvSpPr>
+          <p:spPr>
+            <a:xfrm>
+              <a:off x="6627223" y="2369661"/>
+              <a:ext cx="1445623" cy="698546"/>
+            </a:xfrm>
+            <a:prstGeom prst="flowChartProcess">
+              <a:avLst/>
+            </a:prstGeom>
+          </p:spPr>
+          <p:style>
+            <a:lnRef idx="2">
+              <a:schemeClr val="accent1">
+                <a:shade val="50000"/>
+              </a:schemeClr>
+            </a:lnRef>
+            <a:fillRef idx="1">
+              <a:schemeClr val="accent1"/>
+            </a:fillRef>
+            <a:effectRef idx="0">
+              <a:schemeClr val="accent1"/>
+            </a:effectRef>
+            <a:fontRef idx="minor">
+              <a:schemeClr val="lt1"/>
+            </a:fontRef>
+          </p:style>
+          <p:txBody>
+            <a:bodyPr rtlCol="0" anchor="ctr"/>
+            <a:lstStyle/>
+            <a:p>
+              <a:pPr algn="ctr"/>
+              <a:r>
+                <a:rPr lang="en-US" dirty="0" smtClean="0"/>
+                <a:t>Service B</a:t>
+              </a:r>
+              <a:endParaRPr lang="en-ZA" dirty="0"/>
+            </a:p>
+          </p:txBody>
+        </p:sp>
+        <p:sp>
+          <p:nvSpPr>
+            <p:cNvPr id="7" name="Up-Down Arrow 6"/>
+            <p:cNvSpPr/>
+            <p:nvPr/>
+          </p:nvSpPr>
+          <p:spPr>
+            <a:xfrm>
+              <a:off x="7254240" y="2021612"/>
+              <a:ext cx="191588" cy="349273"/>
+            </a:xfrm>
+            <a:prstGeom prst="upDownArrow">
+              <a:avLst/>
+            </a:prstGeom>
+          </p:spPr>
+          <p:style>
+            <a:lnRef idx="2">
+              <a:schemeClr val="accent1">
+                <a:shade val="50000"/>
+              </a:schemeClr>
+            </a:lnRef>
+            <a:fillRef idx="1">
+              <a:schemeClr val="accent1"/>
+            </a:fillRef>
+            <a:effectRef idx="0">
+              <a:schemeClr val="accent1"/>
+            </a:effectRef>
+            <a:fontRef idx="minor">
+              <a:schemeClr val="lt1"/>
+            </a:fontRef>
+          </p:style>
+          <p:txBody>
+            <a:bodyPr rtlCol="0" anchor="ctr"/>
+            <a:lstStyle/>
+            <a:p>
+              <a:pPr algn="ctr"/>
+              <a:endParaRPr lang="en-ZA"/>
+            </a:p>
+          </p:txBody>
+        </p:sp>
+        <p:sp>
+          <p:nvSpPr>
+            <p:cNvPr id="8" name="Up-Down Arrow 7"/>
+            <p:cNvSpPr/>
+            <p:nvPr/>
+          </p:nvSpPr>
+          <p:spPr>
+            <a:xfrm>
+              <a:off x="1976846" y="1976847"/>
+              <a:ext cx="191588" cy="349273"/>
+            </a:xfrm>
+            <a:prstGeom prst="upDownArrow">
+              <a:avLst/>
+            </a:prstGeom>
+          </p:spPr>
+          <p:style>
+            <a:lnRef idx="2">
+              <a:schemeClr val="accent1">
+                <a:shade val="50000"/>
+              </a:schemeClr>
+            </a:lnRef>
+            <a:fillRef idx="1">
+              <a:schemeClr val="accent1"/>
+            </a:fillRef>
+            <a:effectRef idx="0">
+              <a:schemeClr val="accent1"/>
+            </a:effectRef>
+            <a:fontRef idx="minor">
+              <a:schemeClr val="lt1"/>
+            </a:fontRef>
+          </p:style>
+          <p:txBody>
+            <a:bodyPr rtlCol="0" anchor="ctr"/>
+            <a:lstStyle/>
+            <a:p>
+              <a:pPr algn="ctr"/>
+              <a:endParaRPr lang="en-ZA"/>
+            </a:p>
+          </p:txBody>
+        </p:sp>
+      </p:grpSp>
+      <p:grpSp>
+        <p:nvGrpSpPr>
+          <p:cNvPr id="12" name="Group 11"/>
+          <p:cNvGrpSpPr/>
+          <p:nvPr/>
+        </p:nvGrpSpPr>
+        <p:grpSpPr>
+          <a:xfrm>
+            <a:off x="1183341" y="1362635"/>
+            <a:ext cx="1888814" cy="457200"/>
+            <a:chOff x="1183341" y="1362635"/>
+            <a:chExt cx="1888814" cy="457200"/>
+          </a:xfrm>
+        </p:grpSpPr>
+        <p:sp>
+          <p:nvSpPr>
+            <p:cNvPr id="10" name="Oval 9"/>
+            <p:cNvSpPr/>
+            <p:nvPr/>
+          </p:nvSpPr>
+          <p:spPr>
+            <a:xfrm>
+              <a:off x="1183341" y="1362635"/>
+              <a:ext cx="502024" cy="457200"/>
+            </a:xfrm>
+            <a:prstGeom prst="ellipse">
+              <a:avLst/>
+            </a:prstGeom>
+          </p:spPr>
+          <p:style>
+            <a:lnRef idx="2">
+              <a:schemeClr val="accent1">
+                <a:shade val="50000"/>
+              </a:schemeClr>
+            </a:lnRef>
+            <a:fillRef idx="1">
+              <a:schemeClr val="accent1"/>
+            </a:fillRef>
+            <a:effectRef idx="0">
+              <a:schemeClr val="accent1"/>
+            </a:effectRef>
+            <a:fontRef idx="minor">
+              <a:schemeClr val="lt1"/>
+            </a:fontRef>
+          </p:style>
+          <p:txBody>
+            <a:bodyPr rtlCol="0" anchor="ctr"/>
+            <a:lstStyle/>
+            <a:p>
+              <a:pPr algn="ctr"/>
+              <a:r>
+                <a:rPr lang="en-US" dirty="0" smtClean="0"/>
+                <a:t>1</a:t>
+              </a:r>
+              <a:endParaRPr lang="en-ZA" dirty="0"/>
+            </a:p>
+          </p:txBody>
+        </p:sp>
+        <p:sp>
+          <p:nvSpPr>
+            <p:cNvPr id="11" name="TextBox 10"/>
+            <p:cNvSpPr txBox="1"/>
+            <p:nvPr/>
+          </p:nvSpPr>
+          <p:spPr>
+            <a:xfrm>
+              <a:off x="1685365" y="1385930"/>
+              <a:ext cx="1386790" cy="369332"/>
+            </a:xfrm>
+            <a:prstGeom prst="rect">
+              <a:avLst/>
+            </a:prstGeom>
+            <a:noFill/>
+          </p:spPr>
+          <p:txBody>
+            <a:bodyPr wrap="none" rtlCol="0">
+              <a:spAutoFit/>
+            </a:bodyPr>
+            <a:lstStyle/>
+            <a:p>
+              <a:r>
+                <a:rPr lang="en-US" dirty="0" smtClean="0"/>
+                <a:t>Synchronous</a:t>
+              </a:r>
+              <a:endParaRPr lang="en-ZA" dirty="0"/>
+            </a:p>
+          </p:txBody>
+        </p:sp>
+      </p:grpSp>
+      <p:grpSp>
+        <p:nvGrpSpPr>
+          <p:cNvPr id="13" name="Group 12"/>
+          <p:cNvGrpSpPr/>
+          <p:nvPr/>
+        </p:nvGrpSpPr>
+        <p:grpSpPr>
+          <a:xfrm>
+            <a:off x="1153708" y="3854823"/>
+            <a:ext cx="2004487" cy="457200"/>
+            <a:chOff x="1183341" y="1362635"/>
+            <a:chExt cx="2004487" cy="457200"/>
+          </a:xfrm>
+        </p:grpSpPr>
+        <p:sp>
+          <p:nvSpPr>
+            <p:cNvPr id="14" name="Oval 13"/>
+            <p:cNvSpPr/>
+            <p:nvPr/>
+          </p:nvSpPr>
+          <p:spPr>
+            <a:xfrm>
+              <a:off x="1183341" y="1362635"/>
+              <a:ext cx="502024" cy="457200"/>
+            </a:xfrm>
+            <a:prstGeom prst="ellipse">
+              <a:avLst/>
+            </a:prstGeom>
+          </p:spPr>
+          <p:style>
+            <a:lnRef idx="2">
+              <a:schemeClr val="accent1">
+                <a:shade val="50000"/>
+              </a:schemeClr>
+            </a:lnRef>
+            <a:fillRef idx="1">
+              <a:schemeClr val="accent1"/>
+            </a:fillRef>
+            <a:effectRef idx="0">
+              <a:schemeClr val="accent1"/>
+            </a:effectRef>
+            <a:fontRef idx="minor">
+              <a:schemeClr val="lt1"/>
+            </a:fontRef>
+          </p:style>
+          <p:txBody>
+            <a:bodyPr rtlCol="0" anchor="ctr"/>
+            <a:lstStyle/>
+            <a:p>
+              <a:pPr algn="ctr"/>
+              <a:r>
+                <a:rPr lang="en-US" dirty="0"/>
+                <a:t>2</a:t>
+              </a:r>
+              <a:endParaRPr lang="en-ZA" dirty="0"/>
+            </a:p>
+          </p:txBody>
+        </p:sp>
+        <p:sp>
+          <p:nvSpPr>
+            <p:cNvPr id="15" name="TextBox 14"/>
+            <p:cNvSpPr txBox="1"/>
+            <p:nvPr/>
+          </p:nvSpPr>
+          <p:spPr>
+            <a:xfrm>
+              <a:off x="1685365" y="1385930"/>
+              <a:ext cx="1502463" cy="369332"/>
+            </a:xfrm>
+            <a:prstGeom prst="rect">
+              <a:avLst/>
+            </a:prstGeom>
+            <a:noFill/>
+          </p:spPr>
+          <p:txBody>
+            <a:bodyPr wrap="none" rtlCol="0">
+              <a:spAutoFit/>
+            </a:bodyPr>
+            <a:lstStyle/>
+            <a:p>
+              <a:r>
+                <a:rPr lang="en-US" dirty="0" smtClean="0"/>
+                <a:t>Asynchronous</a:t>
+              </a:r>
+              <a:endParaRPr lang="en-ZA" dirty="0"/>
+            </a:p>
+          </p:txBody>
+        </p:sp>
+      </p:grpSp>
+      <p:grpSp>
+        <p:nvGrpSpPr>
+          <p:cNvPr id="18" name="Group 17"/>
+          <p:cNvGrpSpPr/>
+          <p:nvPr/>
+        </p:nvGrpSpPr>
+        <p:grpSpPr>
+          <a:xfrm>
+            <a:off x="991241" y="4518926"/>
+            <a:ext cx="6723017" cy="1377519"/>
+            <a:chOff x="1349829" y="1690688"/>
+            <a:chExt cx="6723017" cy="1377519"/>
+          </a:xfrm>
+        </p:grpSpPr>
+        <p:sp>
+          <p:nvSpPr>
+            <p:cNvPr id="19" name="Flowchart: Process 18"/>
+            <p:cNvSpPr/>
+            <p:nvPr/>
+          </p:nvSpPr>
+          <p:spPr>
+            <a:xfrm>
+              <a:off x="1349829" y="1690688"/>
+              <a:ext cx="6723017" cy="320992"/>
+            </a:xfrm>
+            <a:prstGeom prst="flowChartProcess">
+              <a:avLst/>
+            </a:prstGeom>
+          </p:spPr>
+          <p:style>
+            <a:lnRef idx="2">
+              <a:schemeClr val="accent1">
+                <a:shade val="50000"/>
+              </a:schemeClr>
+            </a:lnRef>
+            <a:fillRef idx="1">
+              <a:schemeClr val="accent1"/>
+            </a:fillRef>
+            <a:effectRef idx="0">
+              <a:schemeClr val="accent1"/>
+            </a:effectRef>
+            <a:fontRef idx="minor">
+              <a:schemeClr val="lt1"/>
+            </a:fontRef>
+          </p:style>
+          <p:txBody>
+            <a:bodyPr rtlCol="0" anchor="ctr"/>
+            <a:lstStyle/>
+            <a:p>
+              <a:pPr algn="ctr"/>
+              <a:r>
+                <a:rPr lang="en-US" dirty="0" smtClean="0"/>
+                <a:t>Messaging Broker</a:t>
+              </a:r>
+              <a:endParaRPr lang="en-ZA" dirty="0"/>
+            </a:p>
+          </p:txBody>
+        </p:sp>
+        <p:sp>
+          <p:nvSpPr>
+            <p:cNvPr id="20" name="Flowchart: Process 19"/>
+            <p:cNvSpPr/>
+            <p:nvPr/>
+          </p:nvSpPr>
+          <p:spPr>
+            <a:xfrm>
+              <a:off x="1349829" y="2317705"/>
+              <a:ext cx="1445623" cy="698546"/>
+            </a:xfrm>
+            <a:prstGeom prst="flowChartProcess">
+              <a:avLst/>
+            </a:prstGeom>
+          </p:spPr>
+          <p:style>
+            <a:lnRef idx="2">
+              <a:schemeClr val="accent1">
+                <a:shade val="50000"/>
+              </a:schemeClr>
+            </a:lnRef>
+            <a:fillRef idx="1">
+              <a:schemeClr val="accent1"/>
+            </a:fillRef>
+            <a:effectRef idx="0">
+              <a:schemeClr val="accent1"/>
+            </a:effectRef>
+            <a:fontRef idx="minor">
+              <a:schemeClr val="lt1"/>
+            </a:fontRef>
+          </p:style>
+          <p:txBody>
+            <a:bodyPr rtlCol="0" anchor="ctr"/>
+            <a:lstStyle/>
+            <a:p>
+              <a:pPr algn="ctr"/>
+              <a:r>
+                <a:rPr lang="en-US" dirty="0" smtClean="0"/>
+                <a:t>Service A</a:t>
+              </a:r>
+              <a:endParaRPr lang="en-ZA" dirty="0"/>
+            </a:p>
+          </p:txBody>
+        </p:sp>
+        <p:sp>
+          <p:nvSpPr>
+            <p:cNvPr id="21" name="Flowchart: Process 20"/>
+            <p:cNvSpPr/>
+            <p:nvPr/>
+          </p:nvSpPr>
+          <p:spPr>
+            <a:xfrm>
+              <a:off x="6627223" y="2369661"/>
+              <a:ext cx="1445623" cy="698546"/>
+            </a:xfrm>
+            <a:prstGeom prst="flowChartProcess">
+              <a:avLst/>
+            </a:prstGeom>
+          </p:spPr>
+          <p:style>
+            <a:lnRef idx="2">
+              <a:schemeClr val="accent1">
+                <a:shade val="50000"/>
+              </a:schemeClr>
+            </a:lnRef>
+            <a:fillRef idx="1">
+              <a:schemeClr val="accent1"/>
+            </a:fillRef>
+            <a:effectRef idx="0">
+              <a:schemeClr val="accent1"/>
+            </a:effectRef>
+            <a:fontRef idx="minor">
+              <a:schemeClr val="lt1"/>
+            </a:fontRef>
+          </p:style>
+          <p:txBody>
+            <a:bodyPr rtlCol="0" anchor="ctr"/>
+            <a:lstStyle/>
+            <a:p>
+              <a:pPr algn="ctr"/>
+              <a:r>
+                <a:rPr lang="en-US" dirty="0" smtClean="0"/>
+                <a:t>Service B</a:t>
+              </a:r>
+              <a:endParaRPr lang="en-ZA" dirty="0"/>
+            </a:p>
+          </p:txBody>
+        </p:sp>
+      </p:grpSp>
+      <p:sp>
+        <p:nvSpPr>
+          <p:cNvPr id="24" name="Oval 23"/>
           <p:cNvSpPr/>
           <p:nvPr/>
         </p:nvSpPr>
         <p:spPr>
           <a:xfrm>
-            <a:off x="766354" y="2429691"/>
-            <a:ext cx="1820091" cy="844732"/>
-          </a:xfrm>
-          <a:prstGeom prst="rect">
+            <a:off x="861252" y="4518926"/>
+            <a:ext cx="219635" cy="320992"/>
+          </a:xfrm>
+          <a:prstGeom prst="ellipse">
             <a:avLst/>
           </a:prstGeom>
         </p:spPr>
@@ -3184,26 +3723,22 @@
           <a:lstStyle/>
           <a:p>
             <a:pPr algn="ctr"/>
-            <a:r>
-              <a:rPr lang="en-US" dirty="0" smtClean="0"/>
-              <a:t>Legacy Service</a:t>
-            </a:r>
-            <a:endParaRPr lang="en-ZA" dirty="0"/>
-          </a:p>
-        </p:txBody>
-      </p:sp>
-      <p:sp>
-        <p:nvSpPr>
-          <p:cNvPr id="6" name="Flowchart: Magnetic Disk 5"/>
+            <a:endParaRPr lang="en-ZA"/>
+          </a:p>
+        </p:txBody>
+      </p:sp>
+      <p:sp>
+        <p:nvSpPr>
+          <p:cNvPr id="26" name="Up Arrow 25"/>
           <p:cNvSpPr/>
           <p:nvPr/>
         </p:nvSpPr>
         <p:spPr>
           <a:xfrm>
-            <a:off x="3260270" y="4249783"/>
-            <a:ext cx="1808119" cy="1210491"/>
-          </a:xfrm>
-          <a:prstGeom prst="flowChartMagneticDisk">
+            <a:off x="1642284" y="4807960"/>
+            <a:ext cx="206189" cy="349273"/>
+          </a:xfrm>
+          <a:prstGeom prst="upArrow">
             <a:avLst/>
           </a:prstGeom>
         </p:spPr>
@@ -3228,26 +3763,22 @@
           <a:lstStyle/>
           <a:p>
             <a:pPr algn="ctr"/>
-            <a:r>
-              <a:rPr lang="en-US" dirty="0" smtClean="0"/>
-              <a:t>DB allocated configuration data</a:t>
-            </a:r>
-            <a:endParaRPr lang="en-ZA" dirty="0"/>
-          </a:p>
-        </p:txBody>
-      </p:sp>
-      <p:sp>
-        <p:nvSpPr>
-          <p:cNvPr id="7" name="Rectangle 6"/>
+            <a:endParaRPr lang="en-ZA"/>
+          </a:p>
+        </p:txBody>
+      </p:sp>
+      <p:sp>
+        <p:nvSpPr>
+          <p:cNvPr id="27" name="Up Arrow 26"/>
           <p:cNvSpPr/>
           <p:nvPr/>
         </p:nvSpPr>
         <p:spPr>
-          <a:xfrm>
-            <a:off x="1040674" y="2997609"/>
-            <a:ext cx="1820091" cy="844732"/>
-          </a:xfrm>
-          <a:prstGeom prst="rect">
+          <a:xfrm rot="10800000">
+            <a:off x="6895652" y="4839918"/>
+            <a:ext cx="197223" cy="357078"/>
+          </a:xfrm>
+          <a:prstGeom prst="upArrow">
             <a:avLst/>
           </a:prstGeom>
         </p:spPr>
@@ -3272,26 +3803,22 @@
           <a:lstStyle/>
           <a:p>
             <a:pPr algn="ctr"/>
-            <a:r>
-              <a:rPr lang="en-US" dirty="0" smtClean="0"/>
-              <a:t>Legacy Service</a:t>
-            </a:r>
-            <a:endParaRPr lang="en-ZA" dirty="0"/>
-          </a:p>
-        </p:txBody>
-      </p:sp>
-      <p:sp>
-        <p:nvSpPr>
-          <p:cNvPr id="8" name="Rectangle 7"/>
+            <a:endParaRPr lang="en-ZA"/>
+          </a:p>
+        </p:txBody>
+      </p:sp>
+      <p:sp>
+        <p:nvSpPr>
+          <p:cNvPr id="28" name="Flowchart: Process 27"/>
           <p:cNvSpPr/>
           <p:nvPr/>
         </p:nvSpPr>
         <p:spPr>
           <a:xfrm>
-            <a:off x="1314994" y="3613278"/>
-            <a:ext cx="1820091" cy="844732"/>
-          </a:xfrm>
-          <a:prstGeom prst="rect">
+            <a:off x="8321233" y="2654548"/>
+            <a:ext cx="1867796" cy="657537"/>
+          </a:xfrm>
+          <a:prstGeom prst="flowChartProcess">
             <a:avLst/>
           </a:prstGeom>
         </p:spPr>
@@ -3318,7 +3845,18 @@
             <a:pPr algn="ctr"/>
             <a:r>
               <a:rPr lang="en-US" dirty="0" smtClean="0"/>
-              <a:t>Legacy Service</a:t>
+              <a:t>Service C</a:t>
+            </a:r>
+          </a:p>
+          <a:p>
+            <a:pPr algn="ctr"/>
+            <a:r>
+              <a:rPr lang="en-ZA" dirty="0"/>
+              <a:t>@</a:t>
+            </a:r>
+            <a:r>
+              <a:rPr lang="en-ZA" dirty="0" err="1"/>
+              <a:t>EnableAsync</a:t>
             </a:r>
             <a:endParaRPr lang="en-ZA" dirty="0"/>
           </a:p>
@@ -3326,21 +3864,17 @@
       </p:sp>
       <p:sp>
         <p:nvSpPr>
-          <p:cNvPr id="9" name="Bent-Up Arrow 8"/>
+          <p:cNvPr id="29" name="Flowchart: Process 28"/>
           <p:cNvSpPr/>
           <p:nvPr/>
         </p:nvSpPr>
         <p:spPr>
-          <a:xfrm rot="5400000">
-            <a:off x="2354991" y="4168401"/>
-            <a:ext cx="663420" cy="1147136"/>
-          </a:xfrm>
-          <a:prstGeom prst="bentUpArrow">
-            <a:avLst>
-              <a:gd name="adj1" fmla="val 25000"/>
-              <a:gd name="adj2" fmla="val 21817"/>
-              <a:gd name="adj3" fmla="val 25000"/>
-            </a:avLst>
+          <a:xfrm>
+            <a:off x="8334486" y="3547493"/>
+            <a:ext cx="1854543" cy="429310"/>
+          </a:xfrm>
+          <a:prstGeom prst="flowChartProcess">
+            <a:avLst/>
           </a:prstGeom>
         </p:spPr>
         <p:style>
@@ -3364,22 +3898,30 @@
           <a:lstStyle/>
           <a:p>
             <a:pPr algn="ctr"/>
-            <a:endParaRPr lang="en-ZA"/>
-          </a:p>
-        </p:txBody>
-      </p:sp>
-      <p:sp>
-        <p:nvSpPr>
-          <p:cNvPr id="10" name="Rectangle 9"/>
+            <a:r>
+              <a:rPr lang="en-US" dirty="0" smtClean="0"/>
+              <a:t>@</a:t>
+            </a:r>
+            <a:r>
+              <a:rPr lang="en-US" dirty="0" err="1" smtClean="0"/>
+              <a:t>Async</a:t>
+            </a:r>
+            <a:endParaRPr lang="en-ZA" dirty="0"/>
+          </a:p>
+        </p:txBody>
+      </p:sp>
+      <p:sp>
+        <p:nvSpPr>
+          <p:cNvPr id="30" name="Down Arrow 29"/>
           <p:cNvSpPr/>
           <p:nvPr/>
         </p:nvSpPr>
         <p:spPr>
           <a:xfrm>
-            <a:off x="6439989" y="3158572"/>
-            <a:ext cx="1820091" cy="844732"/>
-          </a:xfrm>
-          <a:prstGeom prst="rect">
+            <a:off x="9203739" y="3301588"/>
+            <a:ext cx="189603" cy="228227"/>
+          </a:xfrm>
+          <a:prstGeom prst="downArrow">
             <a:avLst/>
           </a:prstGeom>
         </p:spPr>
@@ -3404,34 +3946,22 @@
           <a:lstStyle/>
           <a:p>
             <a:pPr algn="ctr"/>
-            <a:r>
-              <a:rPr lang="en-US" dirty="0" err="1" smtClean="0"/>
-              <a:t>Config</a:t>
-            </a:r>
-            <a:r>
-              <a:rPr lang="en-US" dirty="0" smtClean="0"/>
-              <a:t> Importer </a:t>
-            </a:r>
-            <a:r>
-              <a:rPr lang="en-US" dirty="0" err="1" smtClean="0"/>
-              <a:t>Microservice</a:t>
-            </a:r>
-            <a:endParaRPr lang="en-ZA" dirty="0"/>
-          </a:p>
-        </p:txBody>
-      </p:sp>
-      <p:sp>
-        <p:nvSpPr>
-          <p:cNvPr id="12" name="Flowchart: Multidocument 11"/>
+            <a:endParaRPr lang="en-ZA"/>
+          </a:p>
+        </p:txBody>
+      </p:sp>
+      <p:sp>
+        <p:nvSpPr>
+          <p:cNvPr id="31" name="Up-Down Arrow 30"/>
           <p:cNvSpPr/>
           <p:nvPr/>
         </p:nvSpPr>
         <p:spPr>
           <a:xfrm>
-            <a:off x="9562010" y="2647406"/>
-            <a:ext cx="1567543" cy="1515291"/>
-          </a:xfrm>
-          <a:prstGeom prst="flowChartMultidocument">
+            <a:off x="9203739" y="2298094"/>
+            <a:ext cx="191588" cy="349273"/>
+          </a:xfrm>
+          <a:prstGeom prst="upDownArrow">
             <a:avLst/>
           </a:prstGeom>
         </p:spPr>
@@ -3456,28 +3986,20 @@
           <a:lstStyle/>
           <a:p>
             <a:pPr algn="ctr"/>
-            <a:r>
-              <a:rPr lang="en-US" dirty="0" err="1" smtClean="0"/>
-              <a:t>Git</a:t>
-            </a:r>
-            <a:r>
-              <a:rPr lang="en-US" dirty="0" smtClean="0"/>
-              <a:t> Repository</a:t>
-            </a:r>
-            <a:endParaRPr lang="en-ZA" dirty="0"/>
-          </a:p>
-        </p:txBody>
-      </p:sp>
-      <p:sp>
-        <p:nvSpPr>
-          <p:cNvPr id="13" name="Rectangle 12"/>
+            <a:endParaRPr lang="en-ZA"/>
+          </a:p>
+        </p:txBody>
+      </p:sp>
+      <p:sp>
+        <p:nvSpPr>
+          <p:cNvPr id="32" name="Rectangle 31"/>
           <p:cNvSpPr/>
           <p:nvPr/>
         </p:nvSpPr>
         <p:spPr>
           <a:xfrm>
-            <a:off x="5564777" y="2720808"/>
-            <a:ext cx="3648892" cy="3941249"/>
+            <a:off x="8192204" y="2498868"/>
+            <a:ext cx="2136162" cy="1620579"/>
           </a:xfrm>
           <a:prstGeom prst="rect">
             <a:avLst/>
@@ -3512,414 +4034,199 @@
           </a:p>
         </p:txBody>
       </p:sp>
-      <p:sp>
-        <p:nvSpPr>
-          <p:cNvPr id="14" name="TextBox 13"/>
-          <p:cNvSpPr txBox="1"/>
-          <p:nvPr/>
-        </p:nvSpPr>
-        <p:spPr>
-          <a:xfrm>
-            <a:off x="5647509" y="2729651"/>
-            <a:ext cx="1741714" cy="369332"/>
-          </a:xfrm>
-          <a:prstGeom prst="rect">
-            <a:avLst/>
-          </a:prstGeom>
-          <a:noFill/>
-        </p:spPr>
-        <p:txBody>
-          <a:bodyPr wrap="square" rtlCol="0">
-            <a:spAutoFit/>
-          </a:bodyPr>
-          <a:lstStyle/>
-          <a:p>
-            <a:r>
-              <a:rPr lang="en-US" dirty="0" err="1" smtClean="0"/>
-              <a:t>Microservices</a:t>
-            </a:r>
-            <a:endParaRPr lang="en-ZA" dirty="0"/>
-          </a:p>
-        </p:txBody>
-      </p:sp>
-      <p:sp>
-        <p:nvSpPr>
-          <p:cNvPr id="15" name="Rectangle 14"/>
-          <p:cNvSpPr/>
-          <p:nvPr/>
-        </p:nvSpPr>
-        <p:spPr>
-          <a:xfrm>
-            <a:off x="6443253" y="4162697"/>
-            <a:ext cx="1820091" cy="844732"/>
-          </a:xfrm>
-          <a:prstGeom prst="rect">
-            <a:avLst/>
-          </a:prstGeom>
-        </p:spPr>
-        <p:style>
-          <a:lnRef idx="2">
-            <a:schemeClr val="accent1">
-              <a:shade val="50000"/>
-            </a:schemeClr>
-          </a:lnRef>
-          <a:fillRef idx="1">
-            <a:schemeClr val="accent1"/>
-          </a:fillRef>
-          <a:effectRef idx="0">
-            <a:schemeClr val="accent1"/>
-          </a:effectRef>
-          <a:fontRef idx="minor">
-            <a:schemeClr val="lt1"/>
-          </a:fontRef>
-        </p:style>
-        <p:txBody>
-          <a:bodyPr rtlCol="0" anchor="ctr"/>
-          <a:lstStyle/>
-          <a:p>
-            <a:pPr algn="ctr"/>
-            <a:r>
-              <a:rPr lang="en-US" dirty="0" err="1" smtClean="0"/>
-              <a:t>Config</a:t>
-            </a:r>
-            <a:r>
-              <a:rPr lang="en-US" dirty="0" smtClean="0"/>
-              <a:t> Service</a:t>
-            </a:r>
-            <a:endParaRPr lang="en-ZA" dirty="0"/>
-          </a:p>
-        </p:txBody>
-      </p:sp>
-      <p:sp>
-        <p:nvSpPr>
-          <p:cNvPr id="17" name="Rectangle 16"/>
-          <p:cNvSpPr/>
-          <p:nvPr/>
-        </p:nvSpPr>
-        <p:spPr>
-          <a:xfrm>
-            <a:off x="5743303" y="5327783"/>
-            <a:ext cx="1820091" cy="844732"/>
-          </a:xfrm>
-          <a:prstGeom prst="rect">
-            <a:avLst/>
-          </a:prstGeom>
-        </p:spPr>
-        <p:style>
-          <a:lnRef idx="2">
-            <a:schemeClr val="accent1">
-              <a:shade val="50000"/>
-            </a:schemeClr>
-          </a:lnRef>
-          <a:fillRef idx="1">
-            <a:schemeClr val="accent1"/>
-          </a:fillRef>
-          <a:effectRef idx="0">
-            <a:schemeClr val="accent1"/>
-          </a:effectRef>
-          <a:fontRef idx="minor">
-            <a:schemeClr val="lt1"/>
-          </a:fontRef>
-        </p:style>
-        <p:txBody>
-          <a:bodyPr rtlCol="0" anchor="ctr"/>
-          <a:lstStyle/>
-          <a:p>
-            <a:pPr algn="ctr"/>
-            <a:r>
-              <a:rPr lang="en-US" dirty="0" err="1" smtClean="0"/>
-              <a:t>Microservice</a:t>
-            </a:r>
-            <a:endParaRPr lang="en-ZA" dirty="0"/>
-          </a:p>
-        </p:txBody>
-      </p:sp>
-      <p:sp>
-        <p:nvSpPr>
-          <p:cNvPr id="18" name="Rectangle 17"/>
-          <p:cNvSpPr/>
-          <p:nvPr/>
-        </p:nvSpPr>
-        <p:spPr>
-          <a:xfrm>
-            <a:off x="7188926" y="5657013"/>
-            <a:ext cx="1820091" cy="844732"/>
-          </a:xfrm>
-          <a:prstGeom prst="rect">
-            <a:avLst/>
-          </a:prstGeom>
-        </p:spPr>
-        <p:style>
-          <a:lnRef idx="2">
-            <a:schemeClr val="accent1">
-              <a:shade val="50000"/>
-            </a:schemeClr>
-          </a:lnRef>
-          <a:fillRef idx="1">
-            <a:schemeClr val="accent1"/>
-          </a:fillRef>
-          <a:effectRef idx="0">
-            <a:schemeClr val="accent1"/>
-          </a:effectRef>
-          <a:fontRef idx="minor">
-            <a:schemeClr val="lt1"/>
-          </a:fontRef>
-        </p:style>
-        <p:txBody>
-          <a:bodyPr rtlCol="0" anchor="ctr"/>
-          <a:lstStyle/>
-          <a:p>
-            <a:pPr algn="ctr"/>
-            <a:r>
-              <a:rPr lang="en-US" dirty="0" err="1" smtClean="0"/>
-              <a:t>Microservice</a:t>
-            </a:r>
-            <a:endParaRPr lang="en-ZA" dirty="0"/>
-          </a:p>
-        </p:txBody>
-      </p:sp>
-      <p:sp>
-        <p:nvSpPr>
-          <p:cNvPr id="19" name="Bent-Up Arrow 18"/>
-          <p:cNvSpPr/>
-          <p:nvPr/>
-        </p:nvSpPr>
-        <p:spPr>
-          <a:xfrm rot="5400000" flipH="1">
-            <a:off x="4783183" y="2592976"/>
-            <a:ext cx="853440" cy="2460172"/>
-          </a:xfrm>
-          <a:prstGeom prst="bentUpArrow">
-            <a:avLst>
-              <a:gd name="adj1" fmla="val 22008"/>
-              <a:gd name="adj2" fmla="val 21817"/>
-              <a:gd name="adj3" fmla="val 25000"/>
-            </a:avLst>
-          </a:prstGeom>
-        </p:spPr>
-        <p:style>
-          <a:lnRef idx="2">
-            <a:schemeClr val="accent1">
-              <a:shade val="50000"/>
-            </a:schemeClr>
-          </a:lnRef>
-          <a:fillRef idx="1">
-            <a:schemeClr val="accent1"/>
-          </a:fillRef>
-          <a:effectRef idx="0">
-            <a:schemeClr val="accent1"/>
-          </a:effectRef>
-          <a:fontRef idx="minor">
-            <a:schemeClr val="lt1"/>
-          </a:fontRef>
-        </p:style>
-        <p:txBody>
-          <a:bodyPr rtlCol="0" anchor="ctr"/>
-          <a:lstStyle/>
-          <a:p>
-            <a:pPr algn="ctr"/>
-            <a:endParaRPr lang="en-ZA"/>
-          </a:p>
-        </p:txBody>
-      </p:sp>
-      <p:sp>
-        <p:nvSpPr>
-          <p:cNvPr id="20" name="Right Arrow 19"/>
-          <p:cNvSpPr/>
-          <p:nvPr/>
-        </p:nvSpPr>
-        <p:spPr>
-          <a:xfrm>
-            <a:off x="8260080" y="3296033"/>
-            <a:ext cx="1395548" cy="387228"/>
-          </a:xfrm>
-          <a:prstGeom prst="rightArrow">
-            <a:avLst/>
-          </a:prstGeom>
-        </p:spPr>
-        <p:style>
-          <a:lnRef idx="2">
-            <a:schemeClr val="accent1">
-              <a:shade val="50000"/>
-            </a:schemeClr>
-          </a:lnRef>
-          <a:fillRef idx="1">
-            <a:schemeClr val="accent1"/>
-          </a:fillRef>
-          <a:effectRef idx="0">
-            <a:schemeClr val="accent1"/>
-          </a:effectRef>
-          <a:fontRef idx="minor">
-            <a:schemeClr val="lt1"/>
-          </a:fontRef>
-        </p:style>
-        <p:txBody>
-          <a:bodyPr rtlCol="0" anchor="ctr"/>
-          <a:lstStyle/>
-          <a:p>
-            <a:pPr algn="ctr"/>
-            <a:endParaRPr lang="en-ZA"/>
-          </a:p>
-        </p:txBody>
-      </p:sp>
-      <p:sp>
-        <p:nvSpPr>
-          <p:cNvPr id="21" name="Bent-Up Arrow 20"/>
-          <p:cNvSpPr/>
-          <p:nvPr/>
-        </p:nvSpPr>
-        <p:spPr>
-          <a:xfrm rot="16200000" flipH="1">
-            <a:off x="8929397" y="3173027"/>
-            <a:ext cx="886410" cy="2225043"/>
-          </a:xfrm>
-          <a:prstGeom prst="bentUpArrow">
-            <a:avLst>
-              <a:gd name="adj1" fmla="val 23728"/>
-              <a:gd name="adj2" fmla="val 20096"/>
-              <a:gd name="adj3" fmla="val 16170"/>
-            </a:avLst>
-          </a:prstGeom>
-        </p:spPr>
-        <p:style>
-          <a:lnRef idx="2">
-            <a:schemeClr val="accent1">
-              <a:shade val="50000"/>
-            </a:schemeClr>
-          </a:lnRef>
-          <a:fillRef idx="1">
-            <a:schemeClr val="accent1"/>
-          </a:fillRef>
-          <a:effectRef idx="0">
-            <a:schemeClr val="accent1"/>
-          </a:effectRef>
-          <a:fontRef idx="minor">
-            <a:schemeClr val="lt1"/>
-          </a:fontRef>
-        </p:style>
-        <p:txBody>
-          <a:bodyPr rtlCol="0" anchor="ctr"/>
-          <a:lstStyle/>
-          <a:p>
-            <a:pPr algn="ctr"/>
-            <a:endParaRPr lang="en-ZA"/>
-          </a:p>
-        </p:txBody>
-      </p:sp>
-      <p:sp>
-        <p:nvSpPr>
-          <p:cNvPr id="22" name="Down Arrow 21"/>
-          <p:cNvSpPr/>
-          <p:nvPr/>
-        </p:nvSpPr>
-        <p:spPr>
-          <a:xfrm rot="10800000">
-            <a:off x="6798128" y="4911633"/>
-            <a:ext cx="285206" cy="478973"/>
-          </a:xfrm>
-          <a:prstGeom prst="downArrow">
-            <a:avLst/>
-          </a:prstGeom>
-        </p:spPr>
-        <p:style>
-          <a:lnRef idx="2">
-            <a:schemeClr val="accent1">
-              <a:shade val="50000"/>
-            </a:schemeClr>
-          </a:lnRef>
-          <a:fillRef idx="1">
-            <a:schemeClr val="accent1"/>
-          </a:fillRef>
-          <a:effectRef idx="0">
-            <a:schemeClr val="accent1"/>
-          </a:effectRef>
-          <a:fontRef idx="minor">
-            <a:schemeClr val="lt1"/>
-          </a:fontRef>
-        </p:style>
-        <p:txBody>
-          <a:bodyPr rtlCol="0" anchor="ctr"/>
-          <a:lstStyle/>
-          <a:p>
-            <a:pPr algn="ctr"/>
-            <a:endParaRPr lang="en-ZA"/>
-          </a:p>
-        </p:txBody>
-      </p:sp>
-      <p:sp>
-        <p:nvSpPr>
-          <p:cNvPr id="23" name="Down Arrow 22"/>
-          <p:cNvSpPr/>
-          <p:nvPr/>
-        </p:nvSpPr>
-        <p:spPr>
-          <a:xfrm rot="10800000">
-            <a:off x="7660821" y="4911632"/>
-            <a:ext cx="285206" cy="788127"/>
-          </a:xfrm>
-          <a:prstGeom prst="downArrow">
-            <a:avLst/>
-          </a:prstGeom>
-        </p:spPr>
-        <p:style>
-          <a:lnRef idx="2">
-            <a:schemeClr val="accent1">
-              <a:shade val="50000"/>
-            </a:schemeClr>
-          </a:lnRef>
-          <a:fillRef idx="1">
-            <a:schemeClr val="accent1"/>
-          </a:fillRef>
-          <a:effectRef idx="0">
-            <a:schemeClr val="accent1"/>
-          </a:effectRef>
-          <a:fontRef idx="minor">
-            <a:schemeClr val="lt1"/>
-          </a:fontRef>
-        </p:style>
-        <p:txBody>
-          <a:bodyPr rtlCol="0" anchor="ctr"/>
-          <a:lstStyle/>
-          <a:p>
-            <a:pPr algn="ctr"/>
-            <a:endParaRPr lang="en-ZA"/>
-          </a:p>
-        </p:txBody>
-      </p:sp>
-      <p:sp>
-        <p:nvSpPr>
-          <p:cNvPr id="24" name="TextBox 23"/>
-          <p:cNvSpPr txBox="1"/>
-          <p:nvPr/>
-        </p:nvSpPr>
-        <p:spPr>
-          <a:xfrm>
-            <a:off x="662251" y="2011680"/>
-            <a:ext cx="652743" cy="369332"/>
-          </a:xfrm>
-          <a:prstGeom prst="rect">
-            <a:avLst/>
-          </a:prstGeom>
-          <a:noFill/>
-        </p:spPr>
-        <p:txBody>
-          <a:bodyPr wrap="none" rtlCol="0">
-            <a:spAutoFit/>
-          </a:bodyPr>
-          <a:lstStyle/>
-          <a:p>
-            <a:r>
-              <a:rPr lang="en-US" dirty="0" smtClean="0"/>
-              <a:t>Idea:</a:t>
-            </a:r>
-            <a:endParaRPr lang="en-ZA" dirty="0"/>
-          </a:p>
-        </p:txBody>
-      </p:sp>
+      <p:grpSp>
+        <p:nvGrpSpPr>
+          <p:cNvPr id="38" name="Group 37"/>
+          <p:cNvGrpSpPr/>
+          <p:nvPr/>
+        </p:nvGrpSpPr>
+        <p:grpSpPr>
+          <a:xfrm>
+            <a:off x="8603262" y="4554908"/>
+            <a:ext cx="3269169" cy="750654"/>
+            <a:chOff x="8501489" y="4214014"/>
+            <a:chExt cx="3269169" cy="750654"/>
+          </a:xfrm>
+        </p:grpSpPr>
+        <p:sp>
+          <p:nvSpPr>
+            <p:cNvPr id="33" name="Oval Callout 32"/>
+            <p:cNvSpPr/>
+            <p:nvPr/>
+          </p:nvSpPr>
+          <p:spPr>
+            <a:xfrm>
+              <a:off x="8501489" y="4214014"/>
+              <a:ext cx="3269169" cy="750654"/>
+            </a:xfrm>
+            <a:prstGeom prst="wedgeEllipseCallout">
+              <a:avLst>
+                <a:gd name="adj1" fmla="val -28539"/>
+                <a:gd name="adj2" fmla="val -120221"/>
+              </a:avLst>
+            </a:prstGeom>
+          </p:spPr>
+          <p:style>
+            <a:lnRef idx="2">
+              <a:schemeClr val="accent1">
+                <a:shade val="50000"/>
+              </a:schemeClr>
+            </a:lnRef>
+            <a:fillRef idx="1">
+              <a:schemeClr val="accent1"/>
+            </a:fillRef>
+            <a:effectRef idx="0">
+              <a:schemeClr val="accent1"/>
+            </a:effectRef>
+            <a:fontRef idx="minor">
+              <a:schemeClr val="lt1"/>
+            </a:fontRef>
+          </p:style>
+          <p:txBody>
+            <a:bodyPr rtlCol="0" anchor="ctr"/>
+            <a:lstStyle/>
+            <a:p>
+              <a:pPr algn="ctr"/>
+              <a:endParaRPr lang="en-ZA"/>
+            </a:p>
+          </p:txBody>
+        </p:sp>
+        <p:grpSp>
+          <p:nvGrpSpPr>
+            <p:cNvPr id="34" name="Group 33"/>
+            <p:cNvGrpSpPr/>
+            <p:nvPr/>
+          </p:nvGrpSpPr>
+          <p:grpSpPr>
+            <a:xfrm>
+              <a:off x="9122872" y="4266175"/>
+              <a:ext cx="2030648" cy="646331"/>
+              <a:chOff x="1183341" y="1268069"/>
+              <a:chExt cx="2030648" cy="646331"/>
+            </a:xfrm>
+          </p:grpSpPr>
+          <p:sp>
+            <p:nvSpPr>
+              <p:cNvPr id="35" name="Oval 34"/>
+              <p:cNvSpPr/>
+              <p:nvPr/>
+            </p:nvSpPr>
+            <p:spPr>
+              <a:xfrm>
+                <a:off x="1183341" y="1362635"/>
+                <a:ext cx="502024" cy="457200"/>
+              </a:xfrm>
+              <a:prstGeom prst="ellipse">
+                <a:avLst/>
+              </a:prstGeom>
+            </p:spPr>
+            <p:style>
+              <a:lnRef idx="2">
+                <a:schemeClr val="accent1">
+                  <a:shade val="50000"/>
+                </a:schemeClr>
+              </a:lnRef>
+              <a:fillRef idx="1">
+                <a:schemeClr val="accent1"/>
+              </a:fillRef>
+              <a:effectRef idx="0">
+                <a:schemeClr val="accent1"/>
+              </a:effectRef>
+              <a:fontRef idx="minor">
+                <a:schemeClr val="lt1"/>
+              </a:fontRef>
+            </p:style>
+            <p:txBody>
+              <a:bodyPr rtlCol="0" anchor="ctr"/>
+              <a:lstStyle/>
+              <a:p>
+                <a:pPr algn="ctr"/>
+                <a:r>
+                  <a:rPr lang="en-US" dirty="0" smtClean="0"/>
+                  <a:t>3</a:t>
+                </a:r>
+                <a:endParaRPr lang="en-ZA" dirty="0"/>
+              </a:p>
+            </p:txBody>
+          </p:sp>
+          <p:sp>
+            <p:nvSpPr>
+              <p:cNvPr id="36" name="TextBox 35"/>
+              <p:cNvSpPr txBox="1"/>
+              <p:nvPr/>
+            </p:nvSpPr>
+            <p:spPr>
+              <a:xfrm>
+                <a:off x="1685365" y="1268069"/>
+                <a:ext cx="1528624" cy="646331"/>
+              </a:xfrm>
+              <a:prstGeom prst="rect">
+                <a:avLst/>
+              </a:prstGeom>
+              <a:noFill/>
+            </p:spPr>
+            <p:txBody>
+              <a:bodyPr wrap="none" rtlCol="0">
+                <a:spAutoFit/>
+              </a:bodyPr>
+              <a:lstStyle/>
+              <a:p>
+                <a:r>
+                  <a:rPr lang="en-US" dirty="0" smtClean="0">
+                    <a:solidFill>
+                      <a:schemeClr val="bg1"/>
+                    </a:solidFill>
+                  </a:rPr>
+                  <a:t>Pseudo </a:t>
+                </a:r>
+                <a:r>
+                  <a:rPr lang="en-US" dirty="0" err="1" smtClean="0">
+                    <a:solidFill>
+                      <a:schemeClr val="bg1"/>
+                    </a:solidFill>
+                  </a:rPr>
+                  <a:t>Async</a:t>
+                </a:r>
+                <a:r>
+                  <a:rPr lang="en-US" dirty="0" smtClean="0">
+                    <a:solidFill>
+                      <a:schemeClr val="bg1"/>
+                    </a:solidFill>
+                  </a:rPr>
+                  <a:t>,</a:t>
+                </a:r>
+              </a:p>
+              <a:p>
+                <a:r>
+                  <a:rPr lang="en-US" dirty="0" smtClean="0">
+                    <a:solidFill>
+                      <a:schemeClr val="bg1"/>
+                    </a:solidFill>
+                  </a:rPr>
+                  <a:t>see </a:t>
+                </a:r>
+                <a:r>
+                  <a:rPr lang="en-US" dirty="0" err="1" smtClean="0">
+                    <a:solidFill>
+                      <a:schemeClr val="bg1"/>
+                    </a:solidFill>
+                  </a:rPr>
+                  <a:t>cim_async</a:t>
+                </a:r>
+                <a:endParaRPr lang="en-ZA" dirty="0">
+                  <a:solidFill>
+                    <a:schemeClr val="bg1"/>
+                  </a:solidFill>
+                </a:endParaRPr>
+              </a:p>
+            </p:txBody>
+          </p:sp>
+        </p:grpSp>
+      </p:grpSp>
     </p:spTree>
     <p:extLst>
       <p:ext uri="{BB962C8B-B14F-4D97-AF65-F5344CB8AC3E}">
-        <p14:creationId xmlns:p14="http://schemas.microsoft.com/office/powerpoint/2010/main" val="3099006978"/>
+        <p14:creationId xmlns:p14="http://schemas.microsoft.com/office/powerpoint/2010/main" val="3740869411"/>
       </p:ext>
     </p:extLst>
   </p:cSld>
@@ -3969,6 +4276,888 @@
           <a:lstStyle/>
           <a:p>
             <a:r>
+              <a:rPr lang="en-US" dirty="0" smtClean="0"/>
+              <a:t>Not included into the concept</a:t>
+            </a:r>
+            <a:endParaRPr lang="en-ZA" dirty="0"/>
+          </a:p>
+        </p:txBody>
+      </p:sp>
+      <p:sp>
+        <p:nvSpPr>
+          <p:cNvPr id="4" name="TextBox 3"/>
+          <p:cNvSpPr txBox="1"/>
+          <p:nvPr/>
+        </p:nvSpPr>
+        <p:spPr>
+          <a:xfrm>
+            <a:off x="522514" y="1593669"/>
+            <a:ext cx="10831286" cy="369332"/>
+          </a:xfrm>
+          <a:prstGeom prst="rect">
+            <a:avLst/>
+          </a:prstGeom>
+          <a:noFill/>
+        </p:spPr>
+        <p:txBody>
+          <a:bodyPr wrap="square" rtlCol="0">
+            <a:spAutoFit/>
+          </a:bodyPr>
+          <a:lstStyle/>
+          <a:p>
+            <a:r>
+              <a:rPr lang="en-US" dirty="0" smtClean="0"/>
+              <a:t>* Configuration: the Spring Could </a:t>
+            </a:r>
+            <a:r>
+              <a:rPr lang="en-US" dirty="0" err="1" smtClean="0"/>
+              <a:t>Config</a:t>
+            </a:r>
+            <a:r>
+              <a:rPr lang="en-US" dirty="0" smtClean="0"/>
+              <a:t> Server with the </a:t>
+            </a:r>
+            <a:r>
+              <a:rPr lang="en-US" dirty="0" err="1" smtClean="0"/>
+              <a:t>Git</a:t>
+            </a:r>
+            <a:r>
+              <a:rPr lang="en-US" dirty="0" smtClean="0"/>
+              <a:t>- based storage of the </a:t>
+            </a:r>
+            <a:r>
+              <a:rPr lang="en-US" dirty="0" err="1" smtClean="0"/>
+              <a:t>config</a:t>
+            </a:r>
+            <a:r>
+              <a:rPr lang="en-US" dirty="0" smtClean="0"/>
+              <a:t> files for all environments;</a:t>
+            </a:r>
+            <a:endParaRPr lang="en-ZA" dirty="0"/>
+          </a:p>
+        </p:txBody>
+      </p:sp>
+      <p:sp>
+        <p:nvSpPr>
+          <p:cNvPr id="5" name="Rectangle 4"/>
+          <p:cNvSpPr/>
+          <p:nvPr/>
+        </p:nvSpPr>
+        <p:spPr>
+          <a:xfrm>
+            <a:off x="766354" y="2429691"/>
+            <a:ext cx="1820091" cy="844732"/>
+          </a:xfrm>
+          <a:prstGeom prst="rect">
+            <a:avLst/>
+          </a:prstGeom>
+        </p:spPr>
+        <p:style>
+          <a:lnRef idx="2">
+            <a:schemeClr val="accent1">
+              <a:shade val="50000"/>
+            </a:schemeClr>
+          </a:lnRef>
+          <a:fillRef idx="1">
+            <a:schemeClr val="accent1"/>
+          </a:fillRef>
+          <a:effectRef idx="0">
+            <a:schemeClr val="accent1"/>
+          </a:effectRef>
+          <a:fontRef idx="minor">
+            <a:schemeClr val="lt1"/>
+          </a:fontRef>
+        </p:style>
+        <p:txBody>
+          <a:bodyPr rtlCol="0" anchor="ctr"/>
+          <a:lstStyle/>
+          <a:p>
+            <a:pPr algn="ctr"/>
+            <a:r>
+              <a:rPr lang="en-US" dirty="0" smtClean="0"/>
+              <a:t>Legacy Service</a:t>
+            </a:r>
+            <a:endParaRPr lang="en-ZA" dirty="0"/>
+          </a:p>
+        </p:txBody>
+      </p:sp>
+      <p:sp>
+        <p:nvSpPr>
+          <p:cNvPr id="6" name="Flowchart: Magnetic Disk 5"/>
+          <p:cNvSpPr/>
+          <p:nvPr/>
+        </p:nvSpPr>
+        <p:spPr>
+          <a:xfrm>
+            <a:off x="3260270" y="4249783"/>
+            <a:ext cx="1808119" cy="1210491"/>
+          </a:xfrm>
+          <a:prstGeom prst="flowChartMagneticDisk">
+            <a:avLst/>
+          </a:prstGeom>
+        </p:spPr>
+        <p:style>
+          <a:lnRef idx="2">
+            <a:schemeClr val="accent1">
+              <a:shade val="50000"/>
+            </a:schemeClr>
+          </a:lnRef>
+          <a:fillRef idx="1">
+            <a:schemeClr val="accent1"/>
+          </a:fillRef>
+          <a:effectRef idx="0">
+            <a:schemeClr val="accent1"/>
+          </a:effectRef>
+          <a:fontRef idx="minor">
+            <a:schemeClr val="lt1"/>
+          </a:fontRef>
+        </p:style>
+        <p:txBody>
+          <a:bodyPr rtlCol="0" anchor="ctr"/>
+          <a:lstStyle/>
+          <a:p>
+            <a:pPr algn="ctr"/>
+            <a:r>
+              <a:rPr lang="en-US" dirty="0" smtClean="0"/>
+              <a:t>DB allocated configuration data</a:t>
+            </a:r>
+            <a:endParaRPr lang="en-ZA" dirty="0"/>
+          </a:p>
+        </p:txBody>
+      </p:sp>
+      <p:sp>
+        <p:nvSpPr>
+          <p:cNvPr id="7" name="Rectangle 6"/>
+          <p:cNvSpPr/>
+          <p:nvPr/>
+        </p:nvSpPr>
+        <p:spPr>
+          <a:xfrm>
+            <a:off x="1040674" y="2997609"/>
+            <a:ext cx="1820091" cy="844732"/>
+          </a:xfrm>
+          <a:prstGeom prst="rect">
+            <a:avLst/>
+          </a:prstGeom>
+        </p:spPr>
+        <p:style>
+          <a:lnRef idx="2">
+            <a:schemeClr val="accent1">
+              <a:shade val="50000"/>
+            </a:schemeClr>
+          </a:lnRef>
+          <a:fillRef idx="1">
+            <a:schemeClr val="accent1"/>
+          </a:fillRef>
+          <a:effectRef idx="0">
+            <a:schemeClr val="accent1"/>
+          </a:effectRef>
+          <a:fontRef idx="minor">
+            <a:schemeClr val="lt1"/>
+          </a:fontRef>
+        </p:style>
+        <p:txBody>
+          <a:bodyPr rtlCol="0" anchor="ctr"/>
+          <a:lstStyle/>
+          <a:p>
+            <a:pPr algn="ctr"/>
+            <a:r>
+              <a:rPr lang="en-US" dirty="0" smtClean="0"/>
+              <a:t>Legacy Service</a:t>
+            </a:r>
+            <a:endParaRPr lang="en-ZA" dirty="0"/>
+          </a:p>
+        </p:txBody>
+      </p:sp>
+      <p:sp>
+        <p:nvSpPr>
+          <p:cNvPr id="8" name="Rectangle 7"/>
+          <p:cNvSpPr/>
+          <p:nvPr/>
+        </p:nvSpPr>
+        <p:spPr>
+          <a:xfrm>
+            <a:off x="1314994" y="3613278"/>
+            <a:ext cx="1820091" cy="844732"/>
+          </a:xfrm>
+          <a:prstGeom prst="rect">
+            <a:avLst/>
+          </a:prstGeom>
+        </p:spPr>
+        <p:style>
+          <a:lnRef idx="2">
+            <a:schemeClr val="accent1">
+              <a:shade val="50000"/>
+            </a:schemeClr>
+          </a:lnRef>
+          <a:fillRef idx="1">
+            <a:schemeClr val="accent1"/>
+          </a:fillRef>
+          <a:effectRef idx="0">
+            <a:schemeClr val="accent1"/>
+          </a:effectRef>
+          <a:fontRef idx="minor">
+            <a:schemeClr val="lt1"/>
+          </a:fontRef>
+        </p:style>
+        <p:txBody>
+          <a:bodyPr rtlCol="0" anchor="ctr"/>
+          <a:lstStyle/>
+          <a:p>
+            <a:pPr algn="ctr"/>
+            <a:r>
+              <a:rPr lang="en-US" dirty="0" smtClean="0"/>
+              <a:t>Legacy Service</a:t>
+            </a:r>
+            <a:endParaRPr lang="en-ZA" dirty="0"/>
+          </a:p>
+        </p:txBody>
+      </p:sp>
+      <p:sp>
+        <p:nvSpPr>
+          <p:cNvPr id="9" name="Bent-Up Arrow 8"/>
+          <p:cNvSpPr/>
+          <p:nvPr/>
+        </p:nvSpPr>
+        <p:spPr>
+          <a:xfrm rot="5400000">
+            <a:off x="2354991" y="4168401"/>
+            <a:ext cx="663420" cy="1147136"/>
+          </a:xfrm>
+          <a:prstGeom prst="bentUpArrow">
+            <a:avLst>
+              <a:gd name="adj1" fmla="val 25000"/>
+              <a:gd name="adj2" fmla="val 21817"/>
+              <a:gd name="adj3" fmla="val 25000"/>
+            </a:avLst>
+          </a:prstGeom>
+        </p:spPr>
+        <p:style>
+          <a:lnRef idx="2">
+            <a:schemeClr val="accent1">
+              <a:shade val="50000"/>
+            </a:schemeClr>
+          </a:lnRef>
+          <a:fillRef idx="1">
+            <a:schemeClr val="accent1"/>
+          </a:fillRef>
+          <a:effectRef idx="0">
+            <a:schemeClr val="accent1"/>
+          </a:effectRef>
+          <a:fontRef idx="minor">
+            <a:schemeClr val="lt1"/>
+          </a:fontRef>
+        </p:style>
+        <p:txBody>
+          <a:bodyPr rtlCol="0" anchor="ctr"/>
+          <a:lstStyle/>
+          <a:p>
+            <a:pPr algn="ctr"/>
+            <a:endParaRPr lang="en-ZA"/>
+          </a:p>
+        </p:txBody>
+      </p:sp>
+      <p:sp>
+        <p:nvSpPr>
+          <p:cNvPr id="10" name="Rectangle 9"/>
+          <p:cNvSpPr/>
+          <p:nvPr/>
+        </p:nvSpPr>
+        <p:spPr>
+          <a:xfrm>
+            <a:off x="6439989" y="3158572"/>
+            <a:ext cx="1820091" cy="844732"/>
+          </a:xfrm>
+          <a:prstGeom prst="rect">
+            <a:avLst/>
+          </a:prstGeom>
+        </p:spPr>
+        <p:style>
+          <a:lnRef idx="2">
+            <a:schemeClr val="accent1">
+              <a:shade val="50000"/>
+            </a:schemeClr>
+          </a:lnRef>
+          <a:fillRef idx="1">
+            <a:schemeClr val="accent1"/>
+          </a:fillRef>
+          <a:effectRef idx="0">
+            <a:schemeClr val="accent1"/>
+          </a:effectRef>
+          <a:fontRef idx="minor">
+            <a:schemeClr val="lt1"/>
+          </a:fontRef>
+        </p:style>
+        <p:txBody>
+          <a:bodyPr rtlCol="0" anchor="ctr"/>
+          <a:lstStyle/>
+          <a:p>
+            <a:pPr algn="ctr"/>
+            <a:r>
+              <a:rPr lang="en-US" dirty="0" err="1" smtClean="0"/>
+              <a:t>Config</a:t>
+            </a:r>
+            <a:r>
+              <a:rPr lang="en-US" dirty="0" smtClean="0"/>
+              <a:t> Importer </a:t>
+            </a:r>
+            <a:r>
+              <a:rPr lang="en-US" dirty="0" err="1" smtClean="0"/>
+              <a:t>Microservice</a:t>
+            </a:r>
+            <a:endParaRPr lang="en-ZA" dirty="0"/>
+          </a:p>
+        </p:txBody>
+      </p:sp>
+      <p:sp>
+        <p:nvSpPr>
+          <p:cNvPr id="12" name="Flowchart: Multidocument 11"/>
+          <p:cNvSpPr/>
+          <p:nvPr/>
+        </p:nvSpPr>
+        <p:spPr>
+          <a:xfrm>
+            <a:off x="9562010" y="2647406"/>
+            <a:ext cx="1567543" cy="1515291"/>
+          </a:xfrm>
+          <a:prstGeom prst="flowChartMultidocument">
+            <a:avLst/>
+          </a:prstGeom>
+        </p:spPr>
+        <p:style>
+          <a:lnRef idx="2">
+            <a:schemeClr val="accent1">
+              <a:shade val="50000"/>
+            </a:schemeClr>
+          </a:lnRef>
+          <a:fillRef idx="1">
+            <a:schemeClr val="accent1"/>
+          </a:fillRef>
+          <a:effectRef idx="0">
+            <a:schemeClr val="accent1"/>
+          </a:effectRef>
+          <a:fontRef idx="minor">
+            <a:schemeClr val="lt1"/>
+          </a:fontRef>
+        </p:style>
+        <p:txBody>
+          <a:bodyPr rtlCol="0" anchor="ctr"/>
+          <a:lstStyle/>
+          <a:p>
+            <a:pPr algn="ctr"/>
+            <a:r>
+              <a:rPr lang="en-US" dirty="0" err="1" smtClean="0"/>
+              <a:t>Git</a:t>
+            </a:r>
+            <a:r>
+              <a:rPr lang="en-US" dirty="0" smtClean="0"/>
+              <a:t> Repository</a:t>
+            </a:r>
+            <a:endParaRPr lang="en-ZA" dirty="0"/>
+          </a:p>
+        </p:txBody>
+      </p:sp>
+      <p:sp>
+        <p:nvSpPr>
+          <p:cNvPr id="13" name="Rectangle 12"/>
+          <p:cNvSpPr/>
+          <p:nvPr/>
+        </p:nvSpPr>
+        <p:spPr>
+          <a:xfrm>
+            <a:off x="5564777" y="2720808"/>
+            <a:ext cx="3648892" cy="3941249"/>
+          </a:xfrm>
+          <a:prstGeom prst="rect">
+            <a:avLst/>
+          </a:prstGeom>
+          <a:noFill/>
+          <a:ln w="38100">
+            <a:prstDash val="dash"/>
+          </a:ln>
+        </p:spPr>
+        <p:style>
+          <a:lnRef idx="2">
+            <a:schemeClr val="accent1">
+              <a:shade val="50000"/>
+            </a:schemeClr>
+          </a:lnRef>
+          <a:fillRef idx="1">
+            <a:schemeClr val="accent1"/>
+          </a:fillRef>
+          <a:effectRef idx="0">
+            <a:schemeClr val="accent1"/>
+          </a:effectRef>
+          <a:fontRef idx="minor">
+            <a:schemeClr val="lt1"/>
+          </a:fontRef>
+        </p:style>
+        <p:txBody>
+          <a:bodyPr rtlCol="0" anchor="ctr"/>
+          <a:lstStyle/>
+          <a:p>
+            <a:pPr algn="ctr"/>
+            <a:endParaRPr lang="en-ZA"/>
+          </a:p>
+        </p:txBody>
+      </p:sp>
+      <p:sp>
+        <p:nvSpPr>
+          <p:cNvPr id="14" name="TextBox 13"/>
+          <p:cNvSpPr txBox="1"/>
+          <p:nvPr/>
+        </p:nvSpPr>
+        <p:spPr>
+          <a:xfrm>
+            <a:off x="5647509" y="2729651"/>
+            <a:ext cx="1741714" cy="369332"/>
+          </a:xfrm>
+          <a:prstGeom prst="rect">
+            <a:avLst/>
+          </a:prstGeom>
+          <a:noFill/>
+        </p:spPr>
+        <p:txBody>
+          <a:bodyPr wrap="square" rtlCol="0">
+            <a:spAutoFit/>
+          </a:bodyPr>
+          <a:lstStyle/>
+          <a:p>
+            <a:r>
+              <a:rPr lang="en-US" dirty="0" err="1" smtClean="0"/>
+              <a:t>Microservices</a:t>
+            </a:r>
+            <a:endParaRPr lang="en-ZA" dirty="0"/>
+          </a:p>
+        </p:txBody>
+      </p:sp>
+      <p:sp>
+        <p:nvSpPr>
+          <p:cNvPr id="15" name="Rectangle 14"/>
+          <p:cNvSpPr/>
+          <p:nvPr/>
+        </p:nvSpPr>
+        <p:spPr>
+          <a:xfrm>
+            <a:off x="6443253" y="4162697"/>
+            <a:ext cx="1820091" cy="844732"/>
+          </a:xfrm>
+          <a:prstGeom prst="rect">
+            <a:avLst/>
+          </a:prstGeom>
+        </p:spPr>
+        <p:style>
+          <a:lnRef idx="2">
+            <a:schemeClr val="accent1">
+              <a:shade val="50000"/>
+            </a:schemeClr>
+          </a:lnRef>
+          <a:fillRef idx="1">
+            <a:schemeClr val="accent1"/>
+          </a:fillRef>
+          <a:effectRef idx="0">
+            <a:schemeClr val="accent1"/>
+          </a:effectRef>
+          <a:fontRef idx="minor">
+            <a:schemeClr val="lt1"/>
+          </a:fontRef>
+        </p:style>
+        <p:txBody>
+          <a:bodyPr rtlCol="0" anchor="ctr"/>
+          <a:lstStyle/>
+          <a:p>
+            <a:pPr algn="ctr"/>
+            <a:r>
+              <a:rPr lang="en-US" dirty="0" err="1" smtClean="0"/>
+              <a:t>Config</a:t>
+            </a:r>
+            <a:r>
+              <a:rPr lang="en-US" dirty="0" smtClean="0"/>
+              <a:t> Service</a:t>
+            </a:r>
+            <a:endParaRPr lang="en-ZA" dirty="0"/>
+          </a:p>
+        </p:txBody>
+      </p:sp>
+      <p:sp>
+        <p:nvSpPr>
+          <p:cNvPr id="17" name="Rectangle 16"/>
+          <p:cNvSpPr/>
+          <p:nvPr/>
+        </p:nvSpPr>
+        <p:spPr>
+          <a:xfrm>
+            <a:off x="5743303" y="5327783"/>
+            <a:ext cx="1820091" cy="844732"/>
+          </a:xfrm>
+          <a:prstGeom prst="rect">
+            <a:avLst/>
+          </a:prstGeom>
+        </p:spPr>
+        <p:style>
+          <a:lnRef idx="2">
+            <a:schemeClr val="accent1">
+              <a:shade val="50000"/>
+            </a:schemeClr>
+          </a:lnRef>
+          <a:fillRef idx="1">
+            <a:schemeClr val="accent1"/>
+          </a:fillRef>
+          <a:effectRef idx="0">
+            <a:schemeClr val="accent1"/>
+          </a:effectRef>
+          <a:fontRef idx="minor">
+            <a:schemeClr val="lt1"/>
+          </a:fontRef>
+        </p:style>
+        <p:txBody>
+          <a:bodyPr rtlCol="0" anchor="ctr"/>
+          <a:lstStyle/>
+          <a:p>
+            <a:pPr algn="ctr"/>
+            <a:r>
+              <a:rPr lang="en-US" dirty="0" err="1" smtClean="0"/>
+              <a:t>Microservice</a:t>
+            </a:r>
+            <a:endParaRPr lang="en-ZA" dirty="0"/>
+          </a:p>
+        </p:txBody>
+      </p:sp>
+      <p:sp>
+        <p:nvSpPr>
+          <p:cNvPr id="18" name="Rectangle 17"/>
+          <p:cNvSpPr/>
+          <p:nvPr/>
+        </p:nvSpPr>
+        <p:spPr>
+          <a:xfrm>
+            <a:off x="7188926" y="5657013"/>
+            <a:ext cx="1820091" cy="844732"/>
+          </a:xfrm>
+          <a:prstGeom prst="rect">
+            <a:avLst/>
+          </a:prstGeom>
+        </p:spPr>
+        <p:style>
+          <a:lnRef idx="2">
+            <a:schemeClr val="accent1">
+              <a:shade val="50000"/>
+            </a:schemeClr>
+          </a:lnRef>
+          <a:fillRef idx="1">
+            <a:schemeClr val="accent1"/>
+          </a:fillRef>
+          <a:effectRef idx="0">
+            <a:schemeClr val="accent1"/>
+          </a:effectRef>
+          <a:fontRef idx="minor">
+            <a:schemeClr val="lt1"/>
+          </a:fontRef>
+        </p:style>
+        <p:txBody>
+          <a:bodyPr rtlCol="0" anchor="ctr"/>
+          <a:lstStyle/>
+          <a:p>
+            <a:pPr algn="ctr"/>
+            <a:r>
+              <a:rPr lang="en-US" dirty="0" err="1" smtClean="0"/>
+              <a:t>Microservice</a:t>
+            </a:r>
+            <a:endParaRPr lang="en-ZA" dirty="0"/>
+          </a:p>
+        </p:txBody>
+      </p:sp>
+      <p:sp>
+        <p:nvSpPr>
+          <p:cNvPr id="19" name="Bent-Up Arrow 18"/>
+          <p:cNvSpPr/>
+          <p:nvPr/>
+        </p:nvSpPr>
+        <p:spPr>
+          <a:xfrm rot="5400000" flipH="1">
+            <a:off x="4783183" y="2592976"/>
+            <a:ext cx="853440" cy="2460172"/>
+          </a:xfrm>
+          <a:prstGeom prst="bentUpArrow">
+            <a:avLst>
+              <a:gd name="adj1" fmla="val 22008"/>
+              <a:gd name="adj2" fmla="val 21817"/>
+              <a:gd name="adj3" fmla="val 25000"/>
+            </a:avLst>
+          </a:prstGeom>
+        </p:spPr>
+        <p:style>
+          <a:lnRef idx="2">
+            <a:schemeClr val="accent1">
+              <a:shade val="50000"/>
+            </a:schemeClr>
+          </a:lnRef>
+          <a:fillRef idx="1">
+            <a:schemeClr val="accent1"/>
+          </a:fillRef>
+          <a:effectRef idx="0">
+            <a:schemeClr val="accent1"/>
+          </a:effectRef>
+          <a:fontRef idx="minor">
+            <a:schemeClr val="lt1"/>
+          </a:fontRef>
+        </p:style>
+        <p:txBody>
+          <a:bodyPr rtlCol="0" anchor="ctr"/>
+          <a:lstStyle/>
+          <a:p>
+            <a:pPr algn="ctr"/>
+            <a:endParaRPr lang="en-ZA"/>
+          </a:p>
+        </p:txBody>
+      </p:sp>
+      <p:sp>
+        <p:nvSpPr>
+          <p:cNvPr id="20" name="Right Arrow 19"/>
+          <p:cNvSpPr/>
+          <p:nvPr/>
+        </p:nvSpPr>
+        <p:spPr>
+          <a:xfrm>
+            <a:off x="8260080" y="3296033"/>
+            <a:ext cx="1395548" cy="387228"/>
+          </a:xfrm>
+          <a:prstGeom prst="rightArrow">
+            <a:avLst/>
+          </a:prstGeom>
+        </p:spPr>
+        <p:style>
+          <a:lnRef idx="2">
+            <a:schemeClr val="accent1">
+              <a:shade val="50000"/>
+            </a:schemeClr>
+          </a:lnRef>
+          <a:fillRef idx="1">
+            <a:schemeClr val="accent1"/>
+          </a:fillRef>
+          <a:effectRef idx="0">
+            <a:schemeClr val="accent1"/>
+          </a:effectRef>
+          <a:fontRef idx="minor">
+            <a:schemeClr val="lt1"/>
+          </a:fontRef>
+        </p:style>
+        <p:txBody>
+          <a:bodyPr rtlCol="0" anchor="ctr"/>
+          <a:lstStyle/>
+          <a:p>
+            <a:pPr algn="ctr"/>
+            <a:endParaRPr lang="en-ZA"/>
+          </a:p>
+        </p:txBody>
+      </p:sp>
+      <p:sp>
+        <p:nvSpPr>
+          <p:cNvPr id="21" name="Bent-Up Arrow 20"/>
+          <p:cNvSpPr/>
+          <p:nvPr/>
+        </p:nvSpPr>
+        <p:spPr>
+          <a:xfrm rot="16200000" flipH="1">
+            <a:off x="8929397" y="3173027"/>
+            <a:ext cx="886410" cy="2225043"/>
+          </a:xfrm>
+          <a:prstGeom prst="bentUpArrow">
+            <a:avLst>
+              <a:gd name="adj1" fmla="val 23728"/>
+              <a:gd name="adj2" fmla="val 20096"/>
+              <a:gd name="adj3" fmla="val 16170"/>
+            </a:avLst>
+          </a:prstGeom>
+        </p:spPr>
+        <p:style>
+          <a:lnRef idx="2">
+            <a:schemeClr val="accent1">
+              <a:shade val="50000"/>
+            </a:schemeClr>
+          </a:lnRef>
+          <a:fillRef idx="1">
+            <a:schemeClr val="accent1"/>
+          </a:fillRef>
+          <a:effectRef idx="0">
+            <a:schemeClr val="accent1"/>
+          </a:effectRef>
+          <a:fontRef idx="minor">
+            <a:schemeClr val="lt1"/>
+          </a:fontRef>
+        </p:style>
+        <p:txBody>
+          <a:bodyPr rtlCol="0" anchor="ctr"/>
+          <a:lstStyle/>
+          <a:p>
+            <a:pPr algn="ctr"/>
+            <a:endParaRPr lang="en-ZA"/>
+          </a:p>
+        </p:txBody>
+      </p:sp>
+      <p:sp>
+        <p:nvSpPr>
+          <p:cNvPr id="22" name="Down Arrow 21"/>
+          <p:cNvSpPr/>
+          <p:nvPr/>
+        </p:nvSpPr>
+        <p:spPr>
+          <a:xfrm rot="10800000">
+            <a:off x="6798128" y="4911633"/>
+            <a:ext cx="285206" cy="478973"/>
+          </a:xfrm>
+          <a:prstGeom prst="downArrow">
+            <a:avLst/>
+          </a:prstGeom>
+        </p:spPr>
+        <p:style>
+          <a:lnRef idx="2">
+            <a:schemeClr val="accent1">
+              <a:shade val="50000"/>
+            </a:schemeClr>
+          </a:lnRef>
+          <a:fillRef idx="1">
+            <a:schemeClr val="accent1"/>
+          </a:fillRef>
+          <a:effectRef idx="0">
+            <a:schemeClr val="accent1"/>
+          </a:effectRef>
+          <a:fontRef idx="minor">
+            <a:schemeClr val="lt1"/>
+          </a:fontRef>
+        </p:style>
+        <p:txBody>
+          <a:bodyPr rtlCol="0" anchor="ctr"/>
+          <a:lstStyle/>
+          <a:p>
+            <a:pPr algn="ctr"/>
+            <a:endParaRPr lang="en-ZA"/>
+          </a:p>
+        </p:txBody>
+      </p:sp>
+      <p:sp>
+        <p:nvSpPr>
+          <p:cNvPr id="23" name="Down Arrow 22"/>
+          <p:cNvSpPr/>
+          <p:nvPr/>
+        </p:nvSpPr>
+        <p:spPr>
+          <a:xfrm rot="10800000">
+            <a:off x="7660821" y="4911632"/>
+            <a:ext cx="285206" cy="788127"/>
+          </a:xfrm>
+          <a:prstGeom prst="downArrow">
+            <a:avLst/>
+          </a:prstGeom>
+        </p:spPr>
+        <p:style>
+          <a:lnRef idx="2">
+            <a:schemeClr val="accent1">
+              <a:shade val="50000"/>
+            </a:schemeClr>
+          </a:lnRef>
+          <a:fillRef idx="1">
+            <a:schemeClr val="accent1"/>
+          </a:fillRef>
+          <a:effectRef idx="0">
+            <a:schemeClr val="accent1"/>
+          </a:effectRef>
+          <a:fontRef idx="minor">
+            <a:schemeClr val="lt1"/>
+          </a:fontRef>
+        </p:style>
+        <p:txBody>
+          <a:bodyPr rtlCol="0" anchor="ctr"/>
+          <a:lstStyle/>
+          <a:p>
+            <a:pPr algn="ctr"/>
+            <a:endParaRPr lang="en-ZA"/>
+          </a:p>
+        </p:txBody>
+      </p:sp>
+      <p:sp>
+        <p:nvSpPr>
+          <p:cNvPr id="24" name="TextBox 23"/>
+          <p:cNvSpPr txBox="1"/>
+          <p:nvPr/>
+        </p:nvSpPr>
+        <p:spPr>
+          <a:xfrm>
+            <a:off x="662251" y="2011680"/>
+            <a:ext cx="652743" cy="369332"/>
+          </a:xfrm>
+          <a:prstGeom prst="rect">
+            <a:avLst/>
+          </a:prstGeom>
+          <a:noFill/>
+        </p:spPr>
+        <p:txBody>
+          <a:bodyPr wrap="none" rtlCol="0">
+            <a:spAutoFit/>
+          </a:bodyPr>
+          <a:lstStyle/>
+          <a:p>
+            <a:r>
+              <a:rPr lang="en-US" dirty="0" smtClean="0"/>
+              <a:t>Idea:</a:t>
+            </a:r>
+            <a:endParaRPr lang="en-ZA" dirty="0"/>
+          </a:p>
+        </p:txBody>
+      </p:sp>
+    </p:spTree>
+    <p:extLst>
+      <p:ext uri="{BB962C8B-B14F-4D97-AF65-F5344CB8AC3E}">
+        <p14:creationId xmlns:p14="http://schemas.microsoft.com/office/powerpoint/2010/main" val="3099006978"/>
+      </p:ext>
+    </p:extLst>
+  </p:cSld>
+  <p:clrMapOvr>
+    <a:masterClrMapping/>
+  </p:clrMapOvr>
+  <p:timing>
+    <p:tnLst>
+      <p:par>
+        <p:cTn id="1" dur="indefinite" restart="never" nodeType="tmRoot"/>
+      </p:par>
+    </p:tnLst>
+  </p:timing>
+</p:sld>
+</file>
+
+<file path=ppt/slides/slide12.xml><?xml version="1.0" encoding="utf-8"?>
+<p:sld xmlns:a="http://schemas.openxmlformats.org/drawingml/2006/main" xmlns:r="http://schemas.openxmlformats.org/officeDocument/2006/relationships" xmlns:p="http://schemas.openxmlformats.org/presentationml/2006/main">
+  <p:cSld>
+    <p:spTree>
+      <p:nvGrpSpPr>
+        <p:cNvPr id="1" name=""/>
+        <p:cNvGrpSpPr/>
+        <p:nvPr/>
+      </p:nvGrpSpPr>
+      <p:grpSpPr>
+        <a:xfrm>
+          <a:off x="0" y="0"/>
+          <a:ext cx="0" cy="0"/>
+          <a:chOff x="0" y="0"/>
+          <a:chExt cx="0" cy="0"/>
+        </a:xfrm>
+      </p:grpSpPr>
+      <p:sp>
+        <p:nvSpPr>
+          <p:cNvPr id="2" name="Title 1"/>
+          <p:cNvSpPr>
+            <a:spLocks noGrp="1"/>
+          </p:cNvSpPr>
+          <p:nvPr>
+            <p:ph type="title"/>
+          </p:nvPr>
+        </p:nvSpPr>
+        <p:spPr/>
+        <p:txBody>
+          <a:bodyPr/>
+          <a:lstStyle/>
+          <a:p>
+            <a:r>
               <a:rPr lang="en-US" dirty="0"/>
               <a:t>Not included into the </a:t>
             </a:r>
@@ -4017,15 +5206,7 @@
             </a:pPr>
             <a:r>
               <a:rPr lang="en-US" dirty="0" smtClean="0"/>
-              <a:t>* Security </a:t>
-            </a:r>
-            <a:r>
-              <a:rPr lang="en-US" dirty="0" smtClean="0"/>
-              <a:t>(OAuth</a:t>
-            </a:r>
-            <a:r>
-              <a:rPr lang="en-US" dirty="0" smtClean="0"/>
-              <a:t>?);</a:t>
+              <a:t>* Security (OAuth?);</a:t>
             </a:r>
           </a:p>
           <a:p>
@@ -4036,7 +5217,6 @@
               <a:rPr lang="en-US" dirty="0" smtClean="0"/>
               <a:t>* Failure Handling;</a:t>
             </a:r>
-            <a:endParaRPr lang="en-US" dirty="0" smtClean="0"/>
           </a:p>
           <a:p>
             <a:pPr marL="0" indent="0">
@@ -4072,7 +5252,7 @@
 </p:sld>
 </file>
 
-<file path=ppt/slides/slide12.xml><?xml version="1.0" encoding="utf-8"?>
+<file path=ppt/slides/slide13.xml><?xml version="1.0" encoding="utf-8"?>
 <p:sld xmlns:a="http://schemas.openxmlformats.org/drawingml/2006/main" xmlns:r="http://schemas.openxmlformats.org/officeDocument/2006/relationships" xmlns:p="http://schemas.openxmlformats.org/presentationml/2006/main">
   <p:cSld>
     <p:spTree>
@@ -4814,7 +5994,7 @@
 </p:sld>
 </file>
 
-<file path=ppt/slides/slide13.xml><?xml version="1.0" encoding="utf-8"?>
+<file path=ppt/slides/slide14.xml><?xml version="1.0" encoding="utf-8"?>
 <p:sld xmlns:a="http://schemas.openxmlformats.org/drawingml/2006/main" xmlns:r="http://schemas.openxmlformats.org/officeDocument/2006/relationships" xmlns:p="http://schemas.openxmlformats.org/presentationml/2006/main">
   <p:cSld>
     <p:spTree>
@@ -5409,7 +6589,7 @@
 </p:sld>
 </file>
 
-<file path=ppt/slides/slide14.xml><?xml version="1.0" encoding="utf-8"?>
+<file path=ppt/slides/slide15.xml><?xml version="1.0" encoding="utf-8"?>
 <p:sld xmlns:a="http://schemas.openxmlformats.org/drawingml/2006/main" xmlns:r="http://schemas.openxmlformats.org/officeDocument/2006/relationships" xmlns:p="http://schemas.openxmlformats.org/presentationml/2006/main">
   <p:cSld>
     <p:spTree>
@@ -6851,7 +8031,7 @@
 </p:sld>
 </file>
 
-<file path=ppt/slides/slide15.xml><?xml version="1.0" encoding="utf-8"?>
+<file path=ppt/slides/slide16.xml><?xml version="1.0" encoding="utf-8"?>
 <p:sld xmlns:a="http://schemas.openxmlformats.org/drawingml/2006/main" xmlns:r="http://schemas.openxmlformats.org/officeDocument/2006/relationships" xmlns:p="http://schemas.openxmlformats.org/presentationml/2006/main">
   <p:cSld>
     <p:spTree>
@@ -6965,7 +8145,7 @@
 </p:sld>
 </file>
 
-<file path=ppt/slides/slide16.xml><?xml version="1.0" encoding="utf-8"?>
+<file path=ppt/slides/slide17.xml><?xml version="1.0" encoding="utf-8"?>
 <p:sld xmlns:a="http://schemas.openxmlformats.org/drawingml/2006/main" xmlns:r="http://schemas.openxmlformats.org/officeDocument/2006/relationships" xmlns:p="http://schemas.openxmlformats.org/presentationml/2006/main">
   <p:cSld>
     <p:spTree>
@@ -7133,7 +8313,15 @@
           <a:p>
             <a:r>
               <a:rPr lang="en-US" dirty="0" smtClean="0"/>
-              <a:t>The conclusions from the previous discussion </a:t>
+              <a:t>The </a:t>
+            </a:r>
+            <a:r>
+              <a:rPr lang="en-US" dirty="0" smtClean="0"/>
+              <a:t>minutes </a:t>
+            </a:r>
+            <a:r>
+              <a:rPr lang="en-US" dirty="0" smtClean="0"/>
+              <a:t>from the previous discussion </a:t>
             </a:r>
             <a:endParaRPr lang="en-ZA" dirty="0"/>
           </a:p>
@@ -9202,10 +10390,10 @@
           </p:nvGrpSpPr>
           <p:grpSpPr>
             <a:xfrm>
-              <a:off x="838199" y="1648305"/>
-              <a:ext cx="2361113" cy="1991925"/>
-              <a:chOff x="838199" y="1648305"/>
-              <a:chExt cx="2361113" cy="1991925"/>
+              <a:off x="838199" y="1648306"/>
+              <a:ext cx="2361113" cy="1991924"/>
+              <a:chOff x="838199" y="1648306"/>
+              <a:chExt cx="2361113" cy="1991924"/>
             </a:xfrm>
           </p:grpSpPr>
           <p:grpSp>
@@ -9216,10 +10404,10 @@
             </p:nvGrpSpPr>
             <p:grpSpPr>
               <a:xfrm>
-                <a:off x="1107928" y="1648305"/>
-                <a:ext cx="1811383" cy="1796646"/>
-                <a:chOff x="1110341" y="1638172"/>
-                <a:chExt cx="1811383" cy="1796646"/>
+                <a:off x="1107928" y="1648306"/>
+                <a:ext cx="1811383" cy="1796645"/>
+                <a:chOff x="1110341" y="1638173"/>
+                <a:chExt cx="1811383" cy="1796645"/>
               </a:xfrm>
             </p:grpSpPr>
             <p:sp>
@@ -9274,7 +10462,7 @@
               </p:nvGrpSpPr>
               <p:grpSpPr>
                 <a:xfrm rot="5400000">
-                  <a:off x="1522671" y="2025400"/>
+                  <a:off x="1522672" y="2025401"/>
                   <a:ext cx="974753" cy="200297"/>
                   <a:chOff x="1750246" y="2994662"/>
                   <a:chExt cx="974753" cy="200297"/>
@@ -10684,11 +11872,7 @@
             </a:r>
             <a:r>
               <a:rPr lang="en-US" dirty="0" smtClean="0"/>
-              <a:t> are </a:t>
-            </a:r>
-            <a:r>
-              <a:rPr lang="en-US" dirty="0" smtClean="0"/>
-              <a:t>stateless;</a:t>
+              <a:t> are stateless;</a:t>
             </a:r>
           </a:p>
           <a:p>
@@ -10704,7 +11888,6 @@
               <a:rPr lang="en-US" dirty="0" smtClean="0"/>
               <a:t> are essential (75-80% coverage).</a:t>
             </a:r>
-            <a:endParaRPr lang="en-US" dirty="0" smtClean="0"/>
           </a:p>
           <a:p>
             <a:endParaRPr lang="en-US" dirty="0"/>
@@ -10810,16 +11993,39 @@
       </p:grpSpPr>
       <p:sp>
         <p:nvSpPr>
-          <p:cNvPr id="25" name="Oval 24"/>
+          <p:cNvPr id="2" name="Title 1"/>
+          <p:cNvSpPr>
+            <a:spLocks noGrp="1"/>
+          </p:cNvSpPr>
+          <p:nvPr>
+            <p:ph type="title"/>
+          </p:nvPr>
+        </p:nvSpPr>
+        <p:spPr/>
+        <p:txBody>
+          <a:bodyPr/>
+          <a:lstStyle/>
+          <a:p>
+            <a:r>
+              <a:rPr lang="en-US" dirty="0" smtClean="0"/>
+              <a:t>The Deployment Model</a:t>
+            </a:r>
+            <a:endParaRPr lang="en-ZA" dirty="0"/>
+          </a:p>
+        </p:txBody>
+      </p:sp>
+      <p:sp>
+        <p:nvSpPr>
+          <p:cNvPr id="4" name="Rectangle 3"/>
           <p:cNvSpPr/>
           <p:nvPr/>
         </p:nvSpPr>
         <p:spPr>
           <a:xfrm>
-            <a:off x="7624612" y="4518926"/>
-            <a:ext cx="219635" cy="320992"/>
-          </a:xfrm>
-          <a:prstGeom prst="ellipse">
+            <a:off x="2684418" y="2725783"/>
+            <a:ext cx="1663337" cy="557349"/>
+          </a:xfrm>
+          <a:prstGeom prst="rect">
             <a:avLst/>
           </a:prstGeom>
         </p:spPr>
@@ -10844,30 +12050,110 @@
           <a:lstStyle/>
           <a:p>
             <a:pPr algn="ctr"/>
+            <a:r>
+              <a:rPr lang="en-US" smtClean="0"/>
+              <a:t>Zookeeper</a:t>
+            </a:r>
+            <a:endParaRPr lang="en-US" dirty="0" smtClean="0"/>
+          </a:p>
+          <a:p>
+            <a:pPr algn="ctr"/>
+            <a:r>
+              <a:rPr lang="en-US" dirty="0" smtClean="0"/>
+              <a:t>(2181)</a:t>
+            </a:r>
+            <a:endParaRPr lang="en-ZA" dirty="0"/>
+          </a:p>
+        </p:txBody>
+      </p:sp>
+      <p:sp>
+        <p:nvSpPr>
+          <p:cNvPr id="5" name="Rectangle 4"/>
+          <p:cNvSpPr/>
+          <p:nvPr/>
+        </p:nvSpPr>
+        <p:spPr>
+          <a:xfrm>
+            <a:off x="2684418" y="3734583"/>
+            <a:ext cx="1663337" cy="557349"/>
+          </a:xfrm>
+          <a:prstGeom prst="rect">
+            <a:avLst/>
+          </a:prstGeom>
+        </p:spPr>
+        <p:style>
+          <a:lnRef idx="2">
+            <a:schemeClr val="accent1">
+              <a:shade val="50000"/>
+            </a:schemeClr>
+          </a:lnRef>
+          <a:fillRef idx="1">
+            <a:schemeClr val="accent1"/>
+          </a:fillRef>
+          <a:effectRef idx="0">
+            <a:schemeClr val="accent1"/>
+          </a:effectRef>
+          <a:fontRef idx="minor">
+            <a:schemeClr val="lt1"/>
+          </a:fontRef>
+        </p:style>
+        <p:txBody>
+          <a:bodyPr rtlCol="0" anchor="ctr"/>
+          <a:lstStyle/>
+          <a:p>
+            <a:pPr algn="ctr"/>
+            <a:r>
+              <a:rPr lang="en-US" dirty="0" smtClean="0"/>
+              <a:t>Kafka</a:t>
+            </a:r>
+          </a:p>
+          <a:p>
+            <a:pPr algn="ctr"/>
+            <a:r>
+              <a:rPr lang="en-US" dirty="0" smtClean="0"/>
+              <a:t>(9092)</a:t>
+            </a:r>
+            <a:endParaRPr lang="en-ZA" dirty="0"/>
+          </a:p>
+        </p:txBody>
+      </p:sp>
+      <p:sp>
+        <p:nvSpPr>
+          <p:cNvPr id="6" name="Up-Down Arrow 5"/>
+          <p:cNvSpPr/>
+          <p:nvPr/>
+        </p:nvSpPr>
+        <p:spPr>
+          <a:xfrm>
+            <a:off x="3368040" y="3206932"/>
+            <a:ext cx="296091" cy="566057"/>
+          </a:xfrm>
+          <a:prstGeom prst="upDownArrow">
+            <a:avLst/>
+          </a:prstGeom>
+        </p:spPr>
+        <p:style>
+          <a:lnRef idx="2">
+            <a:schemeClr val="accent1">
+              <a:shade val="50000"/>
+            </a:schemeClr>
+          </a:lnRef>
+          <a:fillRef idx="1">
+            <a:schemeClr val="accent1"/>
+          </a:fillRef>
+          <a:effectRef idx="0">
+            <a:schemeClr val="accent1"/>
+          </a:effectRef>
+          <a:fontRef idx="minor">
+            <a:schemeClr val="lt1"/>
+          </a:fontRef>
+        </p:style>
+        <p:txBody>
+          <a:bodyPr rtlCol="0" anchor="ctr"/>
+          <a:lstStyle/>
+          <a:p>
+            <a:pPr algn="ctr"/>
             <a:endParaRPr lang="en-ZA"/>
-          </a:p>
-        </p:txBody>
-      </p:sp>
-      <p:sp>
-        <p:nvSpPr>
-          <p:cNvPr id="2" name="Title 1"/>
-          <p:cNvSpPr>
-            <a:spLocks noGrp="1"/>
-          </p:cNvSpPr>
-          <p:nvPr>
-            <p:ph type="title"/>
-          </p:nvPr>
-        </p:nvSpPr>
-        <p:spPr/>
-        <p:txBody>
-          <a:bodyPr/>
-          <a:lstStyle/>
-          <a:p>
-            <a:r>
-              <a:rPr lang="en-US" dirty="0" smtClean="0"/>
-              <a:t>The Integration Patterns</a:t>
-            </a:r>
-            <a:endParaRPr lang="en-ZA" dirty="0"/>
           </a:p>
         </p:txBody>
       </p:sp>
@@ -10879,158 +12165,30 @@
         </p:nvGrpSpPr>
         <p:grpSpPr>
           <a:xfrm>
-            <a:off x="991241" y="1986523"/>
-            <a:ext cx="9337125" cy="1377519"/>
-            <a:chOff x="1349829" y="1690688"/>
-            <a:chExt cx="9337125" cy="1377519"/>
+            <a:off x="2475412" y="2386149"/>
+            <a:ext cx="2081349" cy="2116182"/>
+            <a:chOff x="838200" y="2203269"/>
+            <a:chExt cx="2081349" cy="2013857"/>
           </a:xfrm>
         </p:grpSpPr>
         <p:sp>
           <p:nvSpPr>
-            <p:cNvPr id="4" name="Flowchart: Process 3"/>
+            <p:cNvPr id="7" name="Rectangle 6"/>
             <p:cNvSpPr/>
             <p:nvPr/>
           </p:nvSpPr>
           <p:spPr>
             <a:xfrm>
-              <a:off x="1349829" y="1690688"/>
-              <a:ext cx="9337125" cy="320992"/>
+              <a:off x="838200" y="2220686"/>
+              <a:ext cx="2081349" cy="1996440"/>
             </a:xfrm>
-            <a:prstGeom prst="flowChartProcess">
+            <a:prstGeom prst="rect">
               <a:avLst/>
             </a:prstGeom>
-          </p:spPr>
-          <p:style>
-            <a:lnRef idx="2">
-              <a:schemeClr val="accent1">
-                <a:shade val="50000"/>
-              </a:schemeClr>
-            </a:lnRef>
-            <a:fillRef idx="1">
-              <a:schemeClr val="accent1"/>
-            </a:fillRef>
-            <a:effectRef idx="0">
-              <a:schemeClr val="accent1"/>
-            </a:effectRef>
-            <a:fontRef idx="minor">
-              <a:schemeClr val="lt1"/>
-            </a:fontRef>
-          </p:style>
-          <p:txBody>
-            <a:bodyPr rtlCol="0" anchor="ctr"/>
-            <a:lstStyle/>
-            <a:p>
-              <a:pPr algn="ctr"/>
-              <a:r>
-                <a:rPr lang="en-US" dirty="0" smtClean="0"/>
-                <a:t>Discovery Service (Eureka)</a:t>
-              </a:r>
-              <a:endParaRPr lang="en-ZA" dirty="0"/>
-            </a:p>
-          </p:txBody>
-        </p:sp>
-        <p:sp>
-          <p:nvSpPr>
-            <p:cNvPr id="5" name="Flowchart: Process 4"/>
-            <p:cNvSpPr/>
-            <p:nvPr/>
-          </p:nvSpPr>
-          <p:spPr>
-            <a:xfrm>
-              <a:off x="1349829" y="2317705"/>
-              <a:ext cx="1445623" cy="698546"/>
-            </a:xfrm>
-            <a:prstGeom prst="flowChartProcess">
-              <a:avLst/>
-            </a:prstGeom>
-          </p:spPr>
-          <p:style>
-            <a:lnRef idx="2">
-              <a:schemeClr val="accent1">
-                <a:shade val="50000"/>
-              </a:schemeClr>
-            </a:lnRef>
-            <a:fillRef idx="1">
-              <a:schemeClr val="accent1"/>
-            </a:fillRef>
-            <a:effectRef idx="0">
-              <a:schemeClr val="accent1"/>
-            </a:effectRef>
-            <a:fontRef idx="minor">
-              <a:schemeClr val="lt1"/>
-            </a:fontRef>
-          </p:style>
-          <p:txBody>
-            <a:bodyPr rtlCol="0" anchor="ctr"/>
-            <a:lstStyle/>
-            <a:p>
-              <a:pPr algn="ctr"/>
-              <a:r>
-                <a:rPr lang="en-US" dirty="0" smtClean="0"/>
-                <a:t>Service A</a:t>
-              </a:r>
-              <a:endParaRPr lang="en-ZA" dirty="0"/>
-            </a:p>
-          </p:txBody>
-        </p:sp>
-        <p:sp>
-          <p:nvSpPr>
-            <p:cNvPr id="6" name="Flowchart: Process 5"/>
-            <p:cNvSpPr/>
-            <p:nvPr/>
-          </p:nvSpPr>
-          <p:spPr>
-            <a:xfrm>
-              <a:off x="6627223" y="2369661"/>
-              <a:ext cx="1445623" cy="698546"/>
-            </a:xfrm>
-            <a:prstGeom prst="flowChartProcess">
-              <a:avLst/>
-            </a:prstGeom>
-          </p:spPr>
-          <p:style>
-            <a:lnRef idx="2">
-              <a:schemeClr val="accent1">
-                <a:shade val="50000"/>
-              </a:schemeClr>
-            </a:lnRef>
-            <a:fillRef idx="1">
-              <a:schemeClr val="accent1"/>
-            </a:fillRef>
-            <a:effectRef idx="0">
-              <a:schemeClr val="accent1"/>
-            </a:effectRef>
-            <a:fontRef idx="minor">
-              <a:schemeClr val="lt1"/>
-            </a:fontRef>
-          </p:style>
-          <p:txBody>
-            <a:bodyPr rtlCol="0" anchor="ctr"/>
-            <a:lstStyle/>
-            <a:p>
-              <a:pPr algn="ctr"/>
-              <a:r>
-                <a:rPr lang="en-US" dirty="0" smtClean="0"/>
-                <a:t>Service B</a:t>
-              </a:r>
-              <a:endParaRPr lang="en-ZA" dirty="0"/>
-            </a:p>
-          </p:txBody>
-        </p:sp>
-        <p:sp>
-          <p:nvSpPr>
-            <p:cNvPr id="7" name="Up-Down Arrow 6"/>
-            <p:cNvSpPr/>
-            <p:nvPr/>
-          </p:nvSpPr>
-          <p:spPr>
-            <a:xfrm>
-              <a:off x="7254240" y="2021612"/>
-              <a:ext cx="191588" cy="349273"/>
-            </a:xfrm>
-            <a:prstGeom prst="upDownArrow">
-              <a:avLst/>
-            </a:prstGeom>
+            <a:noFill/>
+            <a:ln w="38100">
+              <a:prstDash val="dash"/>
+            </a:ln>
           </p:spPr>
           <p:style>
             <a:lnRef idx="2">
@@ -11059,113 +12217,14 @@
         </p:sp>
         <p:sp>
           <p:nvSpPr>
-            <p:cNvPr id="8" name="Up-Down Arrow 7"/>
-            <p:cNvSpPr/>
-            <p:nvPr/>
-          </p:nvSpPr>
-          <p:spPr>
-            <a:xfrm>
-              <a:off x="1976846" y="1976847"/>
-              <a:ext cx="191588" cy="349273"/>
-            </a:xfrm>
-            <a:prstGeom prst="upDownArrow">
-              <a:avLst/>
-            </a:prstGeom>
-          </p:spPr>
-          <p:style>
-            <a:lnRef idx="2">
-              <a:schemeClr val="accent1">
-                <a:shade val="50000"/>
-              </a:schemeClr>
-            </a:lnRef>
-            <a:fillRef idx="1">
-              <a:schemeClr val="accent1"/>
-            </a:fillRef>
-            <a:effectRef idx="0">
-              <a:schemeClr val="accent1"/>
-            </a:effectRef>
-            <a:fontRef idx="minor">
-              <a:schemeClr val="lt1"/>
-            </a:fontRef>
-          </p:style>
-          <p:txBody>
-            <a:bodyPr rtlCol="0" anchor="ctr"/>
-            <a:lstStyle/>
-            <a:p>
-              <a:pPr algn="ctr"/>
-              <a:endParaRPr lang="en-ZA"/>
-            </a:p>
-          </p:txBody>
-        </p:sp>
-      </p:grpSp>
-      <p:grpSp>
-        <p:nvGrpSpPr>
-          <p:cNvPr id="12" name="Group 11"/>
-          <p:cNvGrpSpPr/>
-          <p:nvPr/>
-        </p:nvGrpSpPr>
-        <p:grpSpPr>
-          <a:xfrm>
-            <a:off x="1183341" y="1362635"/>
-            <a:ext cx="1888814" cy="457200"/>
-            <a:chOff x="1183341" y="1362635"/>
-            <a:chExt cx="1888814" cy="457200"/>
-          </a:xfrm>
-        </p:grpSpPr>
-        <p:sp>
-          <p:nvSpPr>
-            <p:cNvPr id="10" name="Oval 9"/>
-            <p:cNvSpPr/>
-            <p:nvPr/>
-          </p:nvSpPr>
-          <p:spPr>
-            <a:xfrm>
-              <a:off x="1183341" y="1362635"/>
-              <a:ext cx="502024" cy="457200"/>
-            </a:xfrm>
-            <a:prstGeom prst="ellipse">
-              <a:avLst/>
-            </a:prstGeom>
-          </p:spPr>
-          <p:style>
-            <a:lnRef idx="2">
-              <a:schemeClr val="accent1">
-                <a:shade val="50000"/>
-              </a:schemeClr>
-            </a:lnRef>
-            <a:fillRef idx="1">
-              <a:schemeClr val="accent1"/>
-            </a:fillRef>
-            <a:effectRef idx="0">
-              <a:schemeClr val="accent1"/>
-            </a:effectRef>
-            <a:fontRef idx="minor">
-              <a:schemeClr val="lt1"/>
-            </a:fontRef>
-          </p:style>
-          <p:txBody>
-            <a:bodyPr rtlCol="0" anchor="ctr"/>
-            <a:lstStyle/>
-            <a:p>
-              <a:pPr algn="ctr"/>
-              <a:r>
-                <a:rPr lang="en-US" dirty="0" smtClean="0"/>
-                <a:t>1</a:t>
-              </a:r>
-              <a:endParaRPr lang="en-ZA" dirty="0"/>
-            </a:p>
-          </p:txBody>
-        </p:sp>
-        <p:sp>
-          <p:nvSpPr>
-            <p:cNvPr id="11" name="TextBox 10"/>
+            <p:cNvPr id="8" name="TextBox 7"/>
             <p:cNvSpPr txBox="1"/>
             <p:nvPr/>
           </p:nvSpPr>
           <p:spPr>
             <a:xfrm>
-              <a:off x="1685365" y="1385930"/>
-              <a:ext cx="1386790" cy="369332"/>
+              <a:off x="838200" y="2203269"/>
+              <a:ext cx="1180131" cy="369332"/>
             </a:xfrm>
             <a:prstGeom prst="rect">
               <a:avLst/>
@@ -11180,261 +12239,25 @@
             <a:p>
               <a:r>
                 <a:rPr lang="en-US" dirty="0" smtClean="0"/>
-                <a:t>Synchronous</a:t>
+                <a:t>Messaging</a:t>
               </a:r>
               <a:endParaRPr lang="en-ZA" dirty="0"/>
             </a:p>
           </p:txBody>
         </p:sp>
       </p:grpSp>
-      <p:grpSp>
-        <p:nvGrpSpPr>
-          <p:cNvPr id="13" name="Group 12"/>
-          <p:cNvGrpSpPr/>
-          <p:nvPr/>
-        </p:nvGrpSpPr>
-        <p:grpSpPr>
-          <a:xfrm>
-            <a:off x="1153708" y="3854823"/>
-            <a:ext cx="2004487" cy="457200"/>
-            <a:chOff x="1183341" y="1362635"/>
-            <a:chExt cx="2004487" cy="457200"/>
-          </a:xfrm>
-        </p:grpSpPr>
-        <p:sp>
-          <p:nvSpPr>
-            <p:cNvPr id="14" name="Oval 13"/>
-            <p:cNvSpPr/>
-            <p:nvPr/>
-          </p:nvSpPr>
-          <p:spPr>
-            <a:xfrm>
-              <a:off x="1183341" y="1362635"/>
-              <a:ext cx="502024" cy="457200"/>
-            </a:xfrm>
-            <a:prstGeom prst="ellipse">
-              <a:avLst/>
-            </a:prstGeom>
-          </p:spPr>
-          <p:style>
-            <a:lnRef idx="2">
-              <a:schemeClr val="accent1">
-                <a:shade val="50000"/>
-              </a:schemeClr>
-            </a:lnRef>
-            <a:fillRef idx="1">
-              <a:schemeClr val="accent1"/>
-            </a:fillRef>
-            <a:effectRef idx="0">
-              <a:schemeClr val="accent1"/>
-            </a:effectRef>
-            <a:fontRef idx="minor">
-              <a:schemeClr val="lt1"/>
-            </a:fontRef>
-          </p:style>
-          <p:txBody>
-            <a:bodyPr rtlCol="0" anchor="ctr"/>
-            <a:lstStyle/>
-            <a:p>
-              <a:pPr algn="ctr"/>
-              <a:r>
-                <a:rPr lang="en-US" dirty="0"/>
-                <a:t>2</a:t>
-              </a:r>
-              <a:endParaRPr lang="en-ZA" dirty="0"/>
-            </a:p>
-          </p:txBody>
-        </p:sp>
-        <p:sp>
-          <p:nvSpPr>
-            <p:cNvPr id="15" name="TextBox 14"/>
-            <p:cNvSpPr txBox="1"/>
-            <p:nvPr/>
-          </p:nvSpPr>
-          <p:spPr>
-            <a:xfrm>
-              <a:off x="1685365" y="1385930"/>
-              <a:ext cx="1502463" cy="369332"/>
-            </a:xfrm>
-            <a:prstGeom prst="rect">
-              <a:avLst/>
-            </a:prstGeom>
-            <a:noFill/>
-          </p:spPr>
-          <p:txBody>
-            <a:bodyPr wrap="none" rtlCol="0">
-              <a:spAutoFit/>
-            </a:bodyPr>
-            <a:lstStyle/>
-            <a:p>
-              <a:r>
-                <a:rPr lang="en-US" dirty="0" smtClean="0"/>
-                <a:t>Asynchronous</a:t>
-              </a:r>
-              <a:endParaRPr lang="en-ZA" dirty="0"/>
-            </a:p>
-          </p:txBody>
-        </p:sp>
-      </p:grpSp>
-      <p:grpSp>
-        <p:nvGrpSpPr>
-          <p:cNvPr id="18" name="Group 17"/>
-          <p:cNvGrpSpPr/>
-          <p:nvPr/>
-        </p:nvGrpSpPr>
-        <p:grpSpPr>
-          <a:xfrm>
-            <a:off x="991241" y="4518926"/>
-            <a:ext cx="6723017" cy="1377519"/>
-            <a:chOff x="1349829" y="1690688"/>
-            <a:chExt cx="6723017" cy="1377519"/>
-          </a:xfrm>
-        </p:grpSpPr>
-        <p:sp>
-          <p:nvSpPr>
-            <p:cNvPr id="19" name="Flowchart: Process 18"/>
-            <p:cNvSpPr/>
-            <p:nvPr/>
-          </p:nvSpPr>
-          <p:spPr>
-            <a:xfrm>
-              <a:off x="1349829" y="1690688"/>
-              <a:ext cx="6723017" cy="320992"/>
-            </a:xfrm>
-            <a:prstGeom prst="flowChartProcess">
-              <a:avLst/>
-            </a:prstGeom>
-          </p:spPr>
-          <p:style>
-            <a:lnRef idx="2">
-              <a:schemeClr val="accent1">
-                <a:shade val="50000"/>
-              </a:schemeClr>
-            </a:lnRef>
-            <a:fillRef idx="1">
-              <a:schemeClr val="accent1"/>
-            </a:fillRef>
-            <a:effectRef idx="0">
-              <a:schemeClr val="accent1"/>
-            </a:effectRef>
-            <a:fontRef idx="minor">
-              <a:schemeClr val="lt1"/>
-            </a:fontRef>
-          </p:style>
-          <p:txBody>
-            <a:bodyPr rtlCol="0" anchor="ctr"/>
-            <a:lstStyle/>
-            <a:p>
-              <a:pPr algn="ctr"/>
-              <a:r>
-                <a:rPr lang="en-US" dirty="0" smtClean="0"/>
-                <a:t>Messaging Broker</a:t>
-              </a:r>
-              <a:endParaRPr lang="en-ZA" dirty="0"/>
-            </a:p>
-          </p:txBody>
-        </p:sp>
-        <p:sp>
-          <p:nvSpPr>
-            <p:cNvPr id="20" name="Flowchart: Process 19"/>
-            <p:cNvSpPr/>
-            <p:nvPr/>
-          </p:nvSpPr>
-          <p:spPr>
-            <a:xfrm>
-              <a:off x="1349829" y="2317705"/>
-              <a:ext cx="1445623" cy="698546"/>
-            </a:xfrm>
-            <a:prstGeom prst="flowChartProcess">
-              <a:avLst/>
-            </a:prstGeom>
-          </p:spPr>
-          <p:style>
-            <a:lnRef idx="2">
-              <a:schemeClr val="accent1">
-                <a:shade val="50000"/>
-              </a:schemeClr>
-            </a:lnRef>
-            <a:fillRef idx="1">
-              <a:schemeClr val="accent1"/>
-            </a:fillRef>
-            <a:effectRef idx="0">
-              <a:schemeClr val="accent1"/>
-            </a:effectRef>
-            <a:fontRef idx="minor">
-              <a:schemeClr val="lt1"/>
-            </a:fontRef>
-          </p:style>
-          <p:txBody>
-            <a:bodyPr rtlCol="0" anchor="ctr"/>
-            <a:lstStyle/>
-            <a:p>
-              <a:pPr algn="ctr"/>
-              <a:r>
-                <a:rPr lang="en-US" dirty="0" smtClean="0"/>
-                <a:t>Service A</a:t>
-              </a:r>
-              <a:endParaRPr lang="en-ZA" dirty="0"/>
-            </a:p>
-          </p:txBody>
-        </p:sp>
-        <p:sp>
-          <p:nvSpPr>
-            <p:cNvPr id="21" name="Flowchart: Process 20"/>
-            <p:cNvSpPr/>
-            <p:nvPr/>
-          </p:nvSpPr>
-          <p:spPr>
-            <a:xfrm>
-              <a:off x="6627223" y="2369661"/>
-              <a:ext cx="1445623" cy="698546"/>
-            </a:xfrm>
-            <a:prstGeom prst="flowChartProcess">
-              <a:avLst/>
-            </a:prstGeom>
-          </p:spPr>
-          <p:style>
-            <a:lnRef idx="2">
-              <a:schemeClr val="accent1">
-                <a:shade val="50000"/>
-              </a:schemeClr>
-            </a:lnRef>
-            <a:fillRef idx="1">
-              <a:schemeClr val="accent1"/>
-            </a:fillRef>
-            <a:effectRef idx="0">
-              <a:schemeClr val="accent1"/>
-            </a:effectRef>
-            <a:fontRef idx="minor">
-              <a:schemeClr val="lt1"/>
-            </a:fontRef>
-          </p:style>
-          <p:txBody>
-            <a:bodyPr rtlCol="0" anchor="ctr"/>
-            <a:lstStyle/>
-            <a:p>
-              <a:pPr algn="ctr"/>
-              <a:r>
-                <a:rPr lang="en-US" dirty="0" smtClean="0"/>
-                <a:t>Service B</a:t>
-              </a:r>
-              <a:endParaRPr lang="en-ZA" dirty="0"/>
-            </a:p>
-          </p:txBody>
-        </p:sp>
-      </p:grpSp>
-      <p:sp>
-        <p:nvSpPr>
-          <p:cNvPr id="24" name="Oval 23"/>
+      <p:sp>
+        <p:nvSpPr>
+          <p:cNvPr id="10" name="Rectangle 9"/>
           <p:cNvSpPr/>
           <p:nvPr/>
         </p:nvSpPr>
         <p:spPr>
           <a:xfrm>
-            <a:off x="861252" y="4518926"/>
-            <a:ext cx="219635" cy="320992"/>
-          </a:xfrm>
-          <a:prstGeom prst="ellipse">
+            <a:off x="6241869" y="2386149"/>
+            <a:ext cx="1663337" cy="557349"/>
+          </a:xfrm>
+          <a:prstGeom prst="rect">
             <a:avLst/>
           </a:prstGeom>
         </p:spPr>
@@ -11459,22 +12282,33 @@
           <a:lstStyle/>
           <a:p>
             <a:pPr algn="ctr"/>
-            <a:endParaRPr lang="en-ZA"/>
-          </a:p>
-        </p:txBody>
-      </p:sp>
-      <p:sp>
-        <p:nvSpPr>
-          <p:cNvPr id="26" name="Up Arrow 25"/>
+            <a:r>
+              <a:rPr lang="en-US" dirty="0" smtClean="0"/>
+              <a:t>Eureka</a:t>
+            </a:r>
+          </a:p>
+          <a:p>
+            <a:pPr algn="ctr"/>
+            <a:r>
+              <a:rPr lang="en-US" dirty="0" smtClean="0"/>
+              <a:t>(8761)</a:t>
+            </a:r>
+            <a:endParaRPr lang="en-ZA" dirty="0"/>
+          </a:p>
+        </p:txBody>
+      </p:sp>
+      <p:sp>
+        <p:nvSpPr>
+          <p:cNvPr id="11" name="Rectangle 10"/>
           <p:cNvSpPr/>
           <p:nvPr/>
         </p:nvSpPr>
         <p:spPr>
           <a:xfrm>
-            <a:off x="1642284" y="4807960"/>
-            <a:ext cx="206189" cy="349273"/>
-          </a:xfrm>
-          <a:prstGeom prst="upArrow">
+            <a:off x="4757058" y="4959532"/>
+            <a:ext cx="1663337" cy="557349"/>
+          </a:xfrm>
+          <a:prstGeom prst="rect">
             <a:avLst/>
           </a:prstGeom>
         </p:spPr>
@@ -11499,23 +12333,39 @@
           <a:lstStyle/>
           <a:p>
             <a:pPr algn="ctr"/>
-            <a:endParaRPr lang="en-ZA"/>
-          </a:p>
-        </p:txBody>
-      </p:sp>
-      <p:sp>
-        <p:nvSpPr>
-          <p:cNvPr id="27" name="Up Arrow 26"/>
+            <a:r>
+              <a:rPr lang="en-US" dirty="0" smtClean="0"/>
+              <a:t>Metric Service</a:t>
+            </a:r>
+          </a:p>
+          <a:p>
+            <a:pPr algn="ctr"/>
+            <a:r>
+              <a:rPr lang="en-US" dirty="0" smtClean="0"/>
+              <a:t>(8090)</a:t>
+            </a:r>
+            <a:endParaRPr lang="en-ZA" dirty="0"/>
+          </a:p>
+        </p:txBody>
+      </p:sp>
+      <p:sp>
+        <p:nvSpPr>
+          <p:cNvPr id="12" name="Bent Arrow 11"/>
           <p:cNvSpPr/>
           <p:nvPr/>
         </p:nvSpPr>
         <p:spPr>
-          <a:xfrm rot="10800000">
-            <a:off x="6895652" y="4839918"/>
-            <a:ext cx="197223" cy="357078"/>
-          </a:xfrm>
-          <a:prstGeom prst="upArrow">
-            <a:avLst/>
+          <a:xfrm rot="16200000">
+            <a:off x="3481419" y="4058811"/>
+            <a:ext cx="1042517" cy="1508760"/>
+          </a:xfrm>
+          <a:prstGeom prst="bentArrow">
+            <a:avLst>
+              <a:gd name="adj1" fmla="val 15811"/>
+              <a:gd name="adj2" fmla="val 25000"/>
+              <a:gd name="adj3" fmla="val 25000"/>
+              <a:gd name="adj4" fmla="val 45890"/>
+            </a:avLst>
           </a:prstGeom>
         </p:spPr>
         <p:style>
@@ -11539,22 +12389,26 @@
           <a:lstStyle/>
           <a:p>
             <a:pPr algn="ctr"/>
-            <a:endParaRPr lang="en-ZA"/>
-          </a:p>
-        </p:txBody>
-      </p:sp>
-      <p:sp>
-        <p:nvSpPr>
-          <p:cNvPr id="28" name="Flowchart: Process 27"/>
+            <a:endParaRPr lang="en-ZA">
+              <a:solidFill>
+                <a:schemeClr val="tx1"/>
+              </a:solidFill>
+            </a:endParaRPr>
+          </a:p>
+        </p:txBody>
+      </p:sp>
+      <p:sp>
+        <p:nvSpPr>
+          <p:cNvPr id="13" name="Rectangle 12"/>
           <p:cNvSpPr/>
           <p:nvPr/>
         </p:nvSpPr>
         <p:spPr>
           <a:xfrm>
-            <a:off x="8321233" y="2654548"/>
-            <a:ext cx="1867796" cy="657537"/>
-          </a:xfrm>
-          <a:prstGeom prst="flowChartProcess">
+            <a:off x="7905206" y="3812178"/>
+            <a:ext cx="1663337" cy="557349"/>
+          </a:xfrm>
+          <a:prstGeom prst="rect">
             <a:avLst/>
           </a:prstGeom>
         </p:spPr>
@@ -11581,18 +12435,14 @@
             <a:pPr algn="ctr"/>
             <a:r>
               <a:rPr lang="en-US" dirty="0" smtClean="0"/>
-              <a:t>Service C</a:t>
+              <a:t>CIM Service</a:t>
             </a:r>
           </a:p>
           <a:p>
             <a:pPr algn="ctr"/>
             <a:r>
-              <a:rPr lang="en-ZA" dirty="0"/>
-              <a:t>@</a:t>
-            </a:r>
-            <a:r>
-              <a:rPr lang="en-ZA" dirty="0" err="1"/>
-              <a:t>EnableAsync</a:t>
+              <a:rPr lang="en-US" dirty="0" smtClean="0"/>
+              <a:t>(8070)</a:t>
             </a:r>
             <a:endParaRPr lang="en-ZA" dirty="0"/>
           </a:p>
@@ -11600,16 +12450,16 @@
       </p:sp>
       <p:sp>
         <p:nvSpPr>
-          <p:cNvPr id="29" name="Flowchart: Process 28"/>
+          <p:cNvPr id="14" name="Rectangle 13"/>
           <p:cNvSpPr/>
           <p:nvPr/>
         </p:nvSpPr>
         <p:spPr>
           <a:xfrm>
-            <a:off x="8334486" y="3547493"/>
-            <a:ext cx="1854543" cy="429310"/>
-          </a:xfrm>
-          <a:prstGeom prst="flowChartProcess">
+            <a:off x="7905206" y="4402183"/>
+            <a:ext cx="1663337" cy="557349"/>
+          </a:xfrm>
+          <a:prstGeom prst="rect">
             <a:avLst/>
           </a:prstGeom>
         </p:spPr>
@@ -11636,11 +12486,14 @@
             <a:pPr algn="ctr"/>
             <a:r>
               <a:rPr lang="en-US" dirty="0" smtClean="0"/>
-              <a:t>@</a:t>
-            </a:r>
-            <a:r>
-              <a:rPr lang="en-US" dirty="0" err="1" smtClean="0"/>
-              <a:t>Async</a:t>
+              <a:t>CIM Service</a:t>
+            </a:r>
+          </a:p>
+          <a:p>
+            <a:pPr algn="ctr"/>
+            <a:r>
+              <a:rPr lang="en-US" dirty="0" smtClean="0"/>
+              <a:t>(8071)</a:t>
             </a:r>
             <a:endParaRPr lang="en-ZA" dirty="0"/>
           </a:p>
@@ -11648,17 +12501,22 @@
       </p:sp>
       <p:sp>
         <p:nvSpPr>
-          <p:cNvPr id="30" name="Down Arrow 29"/>
+          <p:cNvPr id="15" name="Bent Arrow 14"/>
           <p:cNvSpPr/>
           <p:nvPr/>
         </p:nvSpPr>
         <p:spPr>
-          <a:xfrm>
-            <a:off x="9203739" y="3301588"/>
-            <a:ext cx="189603" cy="228227"/>
-          </a:xfrm>
-          <a:prstGeom prst="downArrow">
-            <a:avLst/>
+          <a:xfrm rot="16200000">
+            <a:off x="6787246" y="3384369"/>
+            <a:ext cx="1558833" cy="677090"/>
+          </a:xfrm>
+          <a:prstGeom prst="bentArrow">
+            <a:avLst>
+              <a:gd name="adj1" fmla="val 15811"/>
+              <a:gd name="adj2" fmla="val 25000"/>
+              <a:gd name="adj3" fmla="val 25000"/>
+              <a:gd name="adj4" fmla="val 43384"/>
+            </a:avLst>
           </a:prstGeom>
         </p:spPr>
         <p:style>
@@ -11682,22 +12540,26 @@
           <a:lstStyle/>
           <a:p>
             <a:pPr algn="ctr"/>
-            <a:endParaRPr lang="en-ZA"/>
-          </a:p>
-        </p:txBody>
-      </p:sp>
-      <p:sp>
-        <p:nvSpPr>
-          <p:cNvPr id="31" name="Up-Down Arrow 30"/>
+            <a:endParaRPr lang="en-ZA">
+              <a:solidFill>
+                <a:schemeClr val="tx1"/>
+              </a:solidFill>
+            </a:endParaRPr>
+          </a:p>
+        </p:txBody>
+      </p:sp>
+      <p:sp>
+        <p:nvSpPr>
+          <p:cNvPr id="17" name="Rectangle 16"/>
           <p:cNvSpPr/>
           <p:nvPr/>
         </p:nvSpPr>
         <p:spPr>
           <a:xfrm>
-            <a:off x="9203739" y="2298094"/>
-            <a:ext cx="191588" cy="349273"/>
-          </a:xfrm>
-          <a:prstGeom prst="upDownArrow">
+            <a:off x="4767944" y="3812178"/>
+            <a:ext cx="1663337" cy="557349"/>
+          </a:xfrm>
+          <a:prstGeom prst="rect">
             <a:avLst/>
           </a:prstGeom>
         </p:spPr>
@@ -11722,28 +12584,40 @@
           <a:lstStyle/>
           <a:p>
             <a:pPr algn="ctr"/>
-            <a:endParaRPr lang="en-ZA"/>
-          </a:p>
-        </p:txBody>
-      </p:sp>
-      <p:sp>
-        <p:nvSpPr>
-          <p:cNvPr id="32" name="Rectangle 31"/>
+            <a:r>
+              <a:rPr lang="en-US" dirty="0" smtClean="0"/>
+              <a:t>CII Service</a:t>
+            </a:r>
+          </a:p>
+          <a:p>
+            <a:pPr algn="ctr"/>
+            <a:r>
+              <a:rPr lang="en-US" dirty="0" smtClean="0"/>
+              <a:t>(8100)</a:t>
+            </a:r>
+            <a:endParaRPr lang="en-ZA" dirty="0"/>
+          </a:p>
+        </p:txBody>
+      </p:sp>
+      <p:sp>
+        <p:nvSpPr>
+          <p:cNvPr id="18" name="Bent Arrow 17"/>
           <p:cNvSpPr/>
           <p:nvPr/>
         </p:nvSpPr>
         <p:spPr>
-          <a:xfrm>
-            <a:off x="8192204" y="2498868"/>
-            <a:ext cx="2136162" cy="1620579"/>
-          </a:xfrm>
-          <a:prstGeom prst="rect">
-            <a:avLst/>
+          <a:xfrm rot="10800000">
+            <a:off x="6420395" y="2943497"/>
+            <a:ext cx="642259" cy="1249684"/>
+          </a:xfrm>
+          <a:prstGeom prst="bentArrow">
+            <a:avLst>
+              <a:gd name="adj1" fmla="val 15811"/>
+              <a:gd name="adj2" fmla="val 25000"/>
+              <a:gd name="adj3" fmla="val 25000"/>
+              <a:gd name="adj4" fmla="val 43384"/>
+            </a:avLst>
           </a:prstGeom>
-          <a:noFill/>
-          <a:ln w="38100">
-            <a:prstDash val="dash"/>
-          </a:ln>
         </p:spPr>
         <p:style>
           <a:lnRef idx="2">
@@ -11766,203 +12640,260 @@
           <a:lstStyle/>
           <a:p>
             <a:pPr algn="ctr"/>
+            <a:endParaRPr lang="en-ZA">
+              <a:solidFill>
+                <a:schemeClr val="tx1"/>
+              </a:solidFill>
+            </a:endParaRPr>
+          </a:p>
+        </p:txBody>
+      </p:sp>
+      <p:sp>
+        <p:nvSpPr>
+          <p:cNvPr id="19" name="Up-Down Arrow 18"/>
+          <p:cNvSpPr/>
+          <p:nvPr/>
+        </p:nvSpPr>
+        <p:spPr>
+          <a:xfrm rot="16200000">
+            <a:off x="4408715" y="3804028"/>
+            <a:ext cx="296091" cy="566057"/>
+          </a:xfrm>
+          <a:prstGeom prst="upDownArrow">
+            <a:avLst/>
+          </a:prstGeom>
+        </p:spPr>
+        <p:style>
+          <a:lnRef idx="2">
+            <a:schemeClr val="accent1">
+              <a:shade val="50000"/>
+            </a:schemeClr>
+          </a:lnRef>
+          <a:fillRef idx="1">
+            <a:schemeClr val="accent1"/>
+          </a:fillRef>
+          <a:effectRef idx="0">
+            <a:schemeClr val="accent1"/>
+          </a:effectRef>
+          <a:fontRef idx="minor">
+            <a:schemeClr val="lt1"/>
+          </a:fontRef>
+        </p:style>
+        <p:txBody>
+          <a:bodyPr rtlCol="0" anchor="ctr"/>
+          <a:lstStyle/>
+          <a:p>
+            <a:pPr algn="ctr"/>
             <a:endParaRPr lang="en-ZA"/>
           </a:p>
         </p:txBody>
       </p:sp>
-      <p:grpSp>
-        <p:nvGrpSpPr>
-          <p:cNvPr id="38" name="Group 37"/>
-          <p:cNvGrpSpPr/>
-          <p:nvPr/>
-        </p:nvGrpSpPr>
-        <p:grpSpPr>
-          <a:xfrm>
-            <a:off x="8603262" y="4554908"/>
-            <a:ext cx="3269169" cy="750654"/>
-            <a:chOff x="8501489" y="4214014"/>
-            <a:chExt cx="3269169" cy="750654"/>
-          </a:xfrm>
-        </p:grpSpPr>
-        <p:sp>
-          <p:nvSpPr>
-            <p:cNvPr id="33" name="Oval Callout 32"/>
-            <p:cNvSpPr/>
-            <p:nvPr/>
-          </p:nvSpPr>
-          <p:spPr>
-            <a:xfrm>
-              <a:off x="8501489" y="4214014"/>
-              <a:ext cx="3269169" cy="750654"/>
-            </a:xfrm>
-            <a:prstGeom prst="wedgeEllipseCallout">
-              <a:avLst>
-                <a:gd name="adj1" fmla="val -28539"/>
-                <a:gd name="adj2" fmla="val -120221"/>
-              </a:avLst>
-            </a:prstGeom>
-          </p:spPr>
-          <p:style>
-            <a:lnRef idx="2">
-              <a:schemeClr val="accent1">
-                <a:shade val="50000"/>
-              </a:schemeClr>
-            </a:lnRef>
-            <a:fillRef idx="1">
-              <a:schemeClr val="accent1"/>
-            </a:fillRef>
-            <a:effectRef idx="0">
-              <a:schemeClr val="accent1"/>
-            </a:effectRef>
-            <a:fontRef idx="minor">
-              <a:schemeClr val="lt1"/>
-            </a:fontRef>
-          </p:style>
-          <p:txBody>
-            <a:bodyPr rtlCol="0" anchor="ctr"/>
-            <a:lstStyle/>
-            <a:p>
-              <a:pPr algn="ctr"/>
-              <a:endParaRPr lang="en-ZA"/>
-            </a:p>
-          </p:txBody>
-        </p:sp>
-        <p:grpSp>
-          <p:nvGrpSpPr>
-            <p:cNvPr id="34" name="Group 33"/>
-            <p:cNvGrpSpPr/>
-            <p:nvPr/>
-          </p:nvGrpSpPr>
-          <p:grpSpPr>
-            <a:xfrm>
-              <a:off x="9122872" y="4266175"/>
-              <a:ext cx="2030648" cy="646331"/>
-              <a:chOff x="1183341" y="1268069"/>
-              <a:chExt cx="2030648" cy="646331"/>
-            </a:xfrm>
-          </p:grpSpPr>
-          <p:sp>
-            <p:nvSpPr>
-              <p:cNvPr id="35" name="Oval 34"/>
-              <p:cNvSpPr/>
-              <p:nvPr/>
-            </p:nvSpPr>
-            <p:spPr>
-              <a:xfrm>
-                <a:off x="1183341" y="1362635"/>
-                <a:ext cx="502024" cy="457200"/>
-              </a:xfrm>
-              <a:prstGeom prst="ellipse">
-                <a:avLst/>
-              </a:prstGeom>
-            </p:spPr>
-            <p:style>
-              <a:lnRef idx="2">
-                <a:schemeClr val="accent1">
-                  <a:shade val="50000"/>
-                </a:schemeClr>
-              </a:lnRef>
-              <a:fillRef idx="1">
-                <a:schemeClr val="accent1"/>
-              </a:fillRef>
-              <a:effectRef idx="0">
-                <a:schemeClr val="accent1"/>
-              </a:effectRef>
-              <a:fontRef idx="minor">
-                <a:schemeClr val="lt1"/>
-              </a:fontRef>
-            </p:style>
-            <p:txBody>
-              <a:bodyPr rtlCol="0" anchor="ctr"/>
-              <a:lstStyle/>
-              <a:p>
-                <a:pPr algn="ctr"/>
-                <a:r>
-                  <a:rPr lang="en-US" dirty="0" smtClean="0"/>
-                  <a:t>3</a:t>
-                </a:r>
-                <a:endParaRPr lang="en-ZA" dirty="0"/>
-              </a:p>
-            </p:txBody>
-          </p:sp>
-          <p:sp>
-            <p:nvSpPr>
-              <p:cNvPr id="36" name="TextBox 35"/>
-              <p:cNvSpPr txBox="1"/>
-              <p:nvPr/>
-            </p:nvSpPr>
-            <p:spPr>
-              <a:xfrm>
-                <a:off x="1685365" y="1268069"/>
-                <a:ext cx="1528624" cy="646331"/>
-              </a:xfrm>
-              <a:prstGeom prst="rect">
-                <a:avLst/>
-              </a:prstGeom>
-              <a:noFill/>
-            </p:spPr>
-            <p:txBody>
-              <a:bodyPr wrap="none" rtlCol="0">
-                <a:spAutoFit/>
-              </a:bodyPr>
-              <a:lstStyle/>
-              <a:p>
-                <a:r>
-                  <a:rPr lang="en-US" dirty="0" smtClean="0">
-                    <a:solidFill>
-                      <a:schemeClr val="bg1"/>
-                    </a:solidFill>
-                  </a:rPr>
-                  <a:t>Pseudo </a:t>
-                </a:r>
-                <a:r>
-                  <a:rPr lang="en-US" dirty="0" err="1" smtClean="0">
-                    <a:solidFill>
-                      <a:schemeClr val="bg1"/>
-                    </a:solidFill>
-                  </a:rPr>
-                  <a:t>Async</a:t>
-                </a:r>
-                <a:r>
-                  <a:rPr lang="en-US" dirty="0" smtClean="0">
-                    <a:solidFill>
-                      <a:schemeClr val="bg1"/>
-                    </a:solidFill>
-                  </a:rPr>
-                  <a:t>,</a:t>
-                </a:r>
-              </a:p>
-              <a:p>
-                <a:r>
-                  <a:rPr lang="en-US" dirty="0" smtClean="0">
-                    <a:solidFill>
-                      <a:schemeClr val="bg1"/>
-                    </a:solidFill>
-                  </a:rPr>
-                  <a:t>see </a:t>
-                </a:r>
-                <a:r>
-                  <a:rPr lang="en-US" dirty="0" err="1" smtClean="0">
-                    <a:solidFill>
-                      <a:schemeClr val="bg1"/>
-                    </a:solidFill>
-                  </a:rPr>
-                  <a:t>cim_async</a:t>
-                </a:r>
-                <a:endParaRPr lang="en-ZA" dirty="0">
-                  <a:solidFill>
-                    <a:schemeClr val="bg1"/>
-                  </a:solidFill>
-                </a:endParaRPr>
-              </a:p>
-            </p:txBody>
-          </p:sp>
-        </p:grpSp>
-      </p:grpSp>
+      <p:sp>
+        <p:nvSpPr>
+          <p:cNvPr id="20" name="TextBox 19"/>
+          <p:cNvSpPr txBox="1"/>
+          <p:nvPr/>
+        </p:nvSpPr>
+        <p:spPr>
+          <a:xfrm>
+            <a:off x="8769536" y="3346029"/>
+            <a:ext cx="923109" cy="369332"/>
+          </a:xfrm>
+          <a:prstGeom prst="rect">
+            <a:avLst/>
+          </a:prstGeom>
+          <a:noFill/>
+        </p:spPr>
+        <p:txBody>
+          <a:bodyPr wrap="square" rtlCol="0">
+            <a:spAutoFit/>
+          </a:bodyPr>
+          <a:lstStyle/>
+          <a:p>
+            <a:r>
+              <a:rPr lang="en-US" dirty="0" smtClean="0"/>
+              <a:t>REST</a:t>
+            </a:r>
+            <a:endParaRPr lang="en-ZA" dirty="0"/>
+          </a:p>
+        </p:txBody>
+      </p:sp>
+      <p:cxnSp>
+        <p:nvCxnSpPr>
+          <p:cNvPr id="21" name="Straight Connector 20"/>
+          <p:cNvCxnSpPr/>
+          <p:nvPr/>
+        </p:nvCxnSpPr>
+        <p:spPr>
+          <a:xfrm>
+            <a:off x="8780654" y="3416143"/>
+            <a:ext cx="0" cy="401511"/>
+          </a:xfrm>
+          <a:prstGeom prst="line">
+            <a:avLst/>
+          </a:prstGeom>
+          <a:ln w="57150"/>
+        </p:spPr>
+        <p:style>
+          <a:lnRef idx="1">
+            <a:schemeClr val="accent1"/>
+          </a:lnRef>
+          <a:fillRef idx="0">
+            <a:schemeClr val="accent1"/>
+          </a:fillRef>
+          <a:effectRef idx="0">
+            <a:schemeClr val="accent1"/>
+          </a:effectRef>
+          <a:fontRef idx="minor">
+            <a:schemeClr val="tx1"/>
+          </a:fontRef>
+        </p:style>
+      </p:cxnSp>
+      <p:sp>
+        <p:nvSpPr>
+          <p:cNvPr id="22" name="Oval 21"/>
+          <p:cNvSpPr/>
+          <p:nvPr/>
+        </p:nvSpPr>
+        <p:spPr>
+          <a:xfrm rot="5400000">
+            <a:off x="8660679" y="3210853"/>
+            <a:ext cx="217714" cy="200297"/>
+          </a:xfrm>
+          <a:prstGeom prst="ellipse">
+            <a:avLst/>
+          </a:prstGeom>
+        </p:spPr>
+        <p:style>
+          <a:lnRef idx="2">
+            <a:schemeClr val="accent1">
+              <a:shade val="50000"/>
+            </a:schemeClr>
+          </a:lnRef>
+          <a:fillRef idx="1">
+            <a:schemeClr val="accent1"/>
+          </a:fillRef>
+          <a:effectRef idx="0">
+            <a:schemeClr val="accent1"/>
+          </a:effectRef>
+          <a:fontRef idx="minor">
+            <a:schemeClr val="lt1"/>
+          </a:fontRef>
+        </p:style>
+        <p:txBody>
+          <a:bodyPr rtlCol="0" anchor="ctr"/>
+          <a:lstStyle/>
+          <a:p>
+            <a:pPr algn="ctr"/>
+            <a:endParaRPr lang="en-ZA"/>
+          </a:p>
+        </p:txBody>
+      </p:sp>
+      <p:sp>
+        <p:nvSpPr>
+          <p:cNvPr id="24" name="TextBox 23"/>
+          <p:cNvSpPr txBox="1"/>
+          <p:nvPr/>
+        </p:nvSpPr>
+        <p:spPr>
+          <a:xfrm>
+            <a:off x="5618590" y="3383673"/>
+            <a:ext cx="923109" cy="369332"/>
+          </a:xfrm>
+          <a:prstGeom prst="rect">
+            <a:avLst/>
+          </a:prstGeom>
+          <a:noFill/>
+        </p:spPr>
+        <p:txBody>
+          <a:bodyPr wrap="square" rtlCol="0">
+            <a:spAutoFit/>
+          </a:bodyPr>
+          <a:lstStyle/>
+          <a:p>
+            <a:r>
+              <a:rPr lang="en-US" dirty="0" smtClean="0"/>
+              <a:t>SOAP</a:t>
+            </a:r>
+            <a:endParaRPr lang="en-ZA" dirty="0"/>
+          </a:p>
+        </p:txBody>
+      </p:sp>
+      <p:cxnSp>
+        <p:nvCxnSpPr>
+          <p:cNvPr id="25" name="Straight Connector 24"/>
+          <p:cNvCxnSpPr/>
+          <p:nvPr/>
+        </p:nvCxnSpPr>
+        <p:spPr>
+          <a:xfrm>
+            <a:off x="5604667" y="3412943"/>
+            <a:ext cx="0" cy="401511"/>
+          </a:xfrm>
+          <a:prstGeom prst="line">
+            <a:avLst/>
+          </a:prstGeom>
+          <a:ln w="57150"/>
+        </p:spPr>
+        <p:style>
+          <a:lnRef idx="1">
+            <a:schemeClr val="accent1"/>
+          </a:lnRef>
+          <a:fillRef idx="0">
+            <a:schemeClr val="accent1"/>
+          </a:fillRef>
+          <a:effectRef idx="0">
+            <a:schemeClr val="accent1"/>
+          </a:effectRef>
+          <a:fontRef idx="minor">
+            <a:schemeClr val="tx1"/>
+          </a:fontRef>
+        </p:style>
+      </p:cxnSp>
+      <p:sp>
+        <p:nvSpPr>
+          <p:cNvPr id="26" name="Oval 25"/>
+          <p:cNvSpPr/>
+          <p:nvPr/>
+        </p:nvSpPr>
+        <p:spPr>
+          <a:xfrm rot="5400000">
+            <a:off x="5484692" y="3207653"/>
+            <a:ext cx="217714" cy="200297"/>
+          </a:xfrm>
+          <a:prstGeom prst="ellipse">
+            <a:avLst/>
+          </a:prstGeom>
+        </p:spPr>
+        <p:style>
+          <a:lnRef idx="2">
+            <a:schemeClr val="accent1">
+              <a:shade val="50000"/>
+            </a:schemeClr>
+          </a:lnRef>
+          <a:fillRef idx="1">
+            <a:schemeClr val="accent1"/>
+          </a:fillRef>
+          <a:effectRef idx="0">
+            <a:schemeClr val="accent1"/>
+          </a:effectRef>
+          <a:fontRef idx="minor">
+            <a:schemeClr val="lt1"/>
+          </a:fontRef>
+        </p:style>
+        <p:txBody>
+          <a:bodyPr rtlCol="0" anchor="ctr"/>
+          <a:lstStyle/>
+          <a:p>
+            <a:pPr algn="ctr"/>
+            <a:endParaRPr lang="en-ZA"/>
+          </a:p>
+        </p:txBody>
+      </p:sp>
     </p:spTree>
     <p:extLst>
       <p:ext uri="{BB962C8B-B14F-4D97-AF65-F5344CB8AC3E}">
-        <p14:creationId xmlns:p14="http://schemas.microsoft.com/office/powerpoint/2010/main" val="3740869411"/>
+        <p14:creationId xmlns:p14="http://schemas.microsoft.com/office/powerpoint/2010/main" val="886910357"/>
       </p:ext>
     </p:extLst>
   </p:cSld>

</xml_diff>

<commit_message>
Demo file, fixed version
</commit_message>
<xml_diff>
--- a/doc/altron-ms-demo-20190802.pptx
+++ b/doc/altron-ms-demo-20190802.pptx
@@ -8313,15 +8313,7 @@
           <a:p>
             <a:r>
               <a:rPr lang="en-US" dirty="0" smtClean="0"/>
-              <a:t>The </a:t>
-            </a:r>
-            <a:r>
-              <a:rPr lang="en-US" dirty="0" smtClean="0"/>
-              <a:t>minutes </a:t>
-            </a:r>
-            <a:r>
-              <a:rPr lang="en-US" dirty="0" smtClean="0"/>
-              <a:t>from the previous discussion </a:t>
+              <a:t>The minutes from the previous discussion </a:t>
             </a:r>
             <a:endParaRPr lang="en-ZA" dirty="0"/>
           </a:p>
@@ -11806,7 +11798,15 @@
             </a:pPr>
             <a:r>
               <a:rPr lang="en-US" dirty="0" smtClean="0"/>
-              <a:t>Zero Spring configuration in XML. Use annotations instead;</a:t>
+              <a:t>Zero Spring </a:t>
+            </a:r>
+            <a:r>
+              <a:rPr lang="en-US" dirty="0" smtClean="0"/>
+              <a:t>XML- configuration. </a:t>
+            </a:r>
+            <a:r>
+              <a:rPr lang="en-US" dirty="0" smtClean="0"/>
+              <a:t>Use annotations instead;</a:t>
             </a:r>
           </a:p>
           <a:p>

</xml_diff>